<commit_message>
Added slide to discuss garbage collector
</commit_message>
<xml_diff>
--- a/PerfDemo.pptx
+++ b/PerfDemo.pptx
@@ -5,18 +5,19 @@
     <p:sldMasterId id="2147483648" r:id="rId1"/>
   </p:sldMasterIdLst>
   <p:notesMasterIdLst>
-    <p:notesMasterId r:id="rId11"/>
+    <p:notesMasterId r:id="rId12"/>
   </p:notesMasterIdLst>
   <p:sldIdLst>
     <p:sldId id="259" r:id="rId2"/>
-    <p:sldId id="258" r:id="rId3"/>
-    <p:sldId id="257" r:id="rId4"/>
-    <p:sldId id="265" r:id="rId5"/>
-    <p:sldId id="267" r:id="rId6"/>
-    <p:sldId id="269" r:id="rId7"/>
-    <p:sldId id="270" r:id="rId8"/>
-    <p:sldId id="268" r:id="rId9"/>
-    <p:sldId id="266" r:id="rId10"/>
+    <p:sldId id="271" r:id="rId3"/>
+    <p:sldId id="258" r:id="rId4"/>
+    <p:sldId id="257" r:id="rId5"/>
+    <p:sldId id="265" r:id="rId6"/>
+    <p:sldId id="267" r:id="rId7"/>
+    <p:sldId id="269" r:id="rId8"/>
+    <p:sldId id="270" r:id="rId9"/>
+    <p:sldId id="268" r:id="rId10"/>
+    <p:sldId id="266" r:id="rId11"/>
   </p:sldIdLst>
   <p:sldSz cx="12192000" cy="6858000"/>
   <p:notesSz cx="6858000" cy="9144000"/>
@@ -205,7 +206,7 @@
           <a:p>
             <a:fld id="{A2D74822-7559-4916-B24A-593FC009153C}" type="datetimeFigureOut">
               <a:rPr lang="en-GB" smtClean="0"/>
-              <a:t>24/11/2025</a:t>
+              <a:t>25/11/2025</a:t>
             </a:fld>
             <a:endParaRPr lang="en-GB"/>
           </a:p>
@@ -622,7 +623,7 @@
           <a:p>
             <a:fld id="{EDE7073B-89AF-4EE7-989E-7E254B1A4C64}" type="datetimeFigureOut">
               <a:rPr lang="en-GB" smtClean="0"/>
-              <a:t>24/11/2025</a:t>
+              <a:t>25/11/2025</a:t>
             </a:fld>
             <a:endParaRPr lang="en-GB"/>
           </a:p>
@@ -822,7 +823,7 @@
           <a:p>
             <a:fld id="{EDE7073B-89AF-4EE7-989E-7E254B1A4C64}" type="datetimeFigureOut">
               <a:rPr lang="en-GB" smtClean="0"/>
-              <a:t>24/11/2025</a:t>
+              <a:t>25/11/2025</a:t>
             </a:fld>
             <a:endParaRPr lang="en-GB"/>
           </a:p>
@@ -1032,7 +1033,7 @@
           <a:p>
             <a:fld id="{EDE7073B-89AF-4EE7-989E-7E254B1A4C64}" type="datetimeFigureOut">
               <a:rPr lang="en-GB" smtClean="0"/>
-              <a:t>24/11/2025</a:t>
+              <a:t>25/11/2025</a:t>
             </a:fld>
             <a:endParaRPr lang="en-GB"/>
           </a:p>
@@ -1232,7 +1233,7 @@
           <a:p>
             <a:fld id="{EDE7073B-89AF-4EE7-989E-7E254B1A4C64}" type="datetimeFigureOut">
               <a:rPr lang="en-GB" smtClean="0"/>
-              <a:t>24/11/2025</a:t>
+              <a:t>25/11/2025</a:t>
             </a:fld>
             <a:endParaRPr lang="en-GB"/>
           </a:p>
@@ -1508,7 +1509,7 @@
           <a:p>
             <a:fld id="{EDE7073B-89AF-4EE7-989E-7E254B1A4C64}" type="datetimeFigureOut">
               <a:rPr lang="en-GB" smtClean="0"/>
-              <a:t>24/11/2025</a:t>
+              <a:t>25/11/2025</a:t>
             </a:fld>
             <a:endParaRPr lang="en-GB"/>
           </a:p>
@@ -1776,7 +1777,7 @@
           <a:p>
             <a:fld id="{EDE7073B-89AF-4EE7-989E-7E254B1A4C64}" type="datetimeFigureOut">
               <a:rPr lang="en-GB" smtClean="0"/>
-              <a:t>24/11/2025</a:t>
+              <a:t>25/11/2025</a:t>
             </a:fld>
             <a:endParaRPr lang="en-GB"/>
           </a:p>
@@ -2191,7 +2192,7 @@
           <a:p>
             <a:fld id="{EDE7073B-89AF-4EE7-989E-7E254B1A4C64}" type="datetimeFigureOut">
               <a:rPr lang="en-GB" smtClean="0"/>
-              <a:t>24/11/2025</a:t>
+              <a:t>25/11/2025</a:t>
             </a:fld>
             <a:endParaRPr lang="en-GB"/>
           </a:p>
@@ -2333,7 +2334,7 @@
           <a:p>
             <a:fld id="{EDE7073B-89AF-4EE7-989E-7E254B1A4C64}" type="datetimeFigureOut">
               <a:rPr lang="en-GB" smtClean="0"/>
-              <a:t>24/11/2025</a:t>
+              <a:t>25/11/2025</a:t>
             </a:fld>
             <a:endParaRPr lang="en-GB"/>
           </a:p>
@@ -2446,7 +2447,7 @@
           <a:p>
             <a:fld id="{EDE7073B-89AF-4EE7-989E-7E254B1A4C64}" type="datetimeFigureOut">
               <a:rPr lang="en-GB" smtClean="0"/>
-              <a:t>24/11/2025</a:t>
+              <a:t>25/11/2025</a:t>
             </a:fld>
             <a:endParaRPr lang="en-GB"/>
           </a:p>
@@ -2759,7 +2760,7 @@
           <a:p>
             <a:fld id="{EDE7073B-89AF-4EE7-989E-7E254B1A4C64}" type="datetimeFigureOut">
               <a:rPr lang="en-GB" smtClean="0"/>
-              <a:t>24/11/2025</a:t>
+              <a:t>25/11/2025</a:t>
             </a:fld>
             <a:endParaRPr lang="en-GB"/>
           </a:p>
@@ -3048,7 +3049,7 @@
           <a:p>
             <a:fld id="{EDE7073B-89AF-4EE7-989E-7E254B1A4C64}" type="datetimeFigureOut">
               <a:rPr lang="en-GB" smtClean="0"/>
-              <a:t>24/11/2025</a:t>
+              <a:t>25/11/2025</a:t>
             </a:fld>
             <a:endParaRPr lang="en-GB"/>
           </a:p>
@@ -3291,7 +3292,7 @@
           <a:p>
             <a:fld id="{EDE7073B-89AF-4EE7-989E-7E254B1A4C64}" type="datetimeFigureOut">
               <a:rPr lang="en-GB" smtClean="0"/>
-              <a:t>24/11/2025</a:t>
+              <a:t>25/11/2025</a:t>
             </a:fld>
             <a:endParaRPr lang="en-GB"/>
           </a:p>
@@ -3961,6 +3962,188 @@
 </p:sld>
 </file>
 
+<file path=ppt/slides/slide10.xml><?xml version="1.0" encoding="utf-8"?>
+<p:sld xmlns:a="http://schemas.openxmlformats.org/drawingml/2006/main" xmlns:r="http://schemas.openxmlformats.org/officeDocument/2006/relationships" xmlns:p="http://schemas.openxmlformats.org/presentationml/2006/main">
+  <p:cSld>
+    <p:spTree>
+      <p:nvGrpSpPr>
+        <p:cNvPr id="1" name=""/>
+        <p:cNvGrpSpPr/>
+        <p:nvPr/>
+      </p:nvGrpSpPr>
+      <p:grpSpPr>
+        <a:xfrm>
+          <a:off x="0" y="0"/>
+          <a:ext cx="0" cy="0"/>
+          <a:chOff x="0" y="0"/>
+          <a:chExt cx="0" cy="0"/>
+        </a:xfrm>
+      </p:grpSpPr>
+      <p:sp>
+        <p:nvSpPr>
+          <p:cNvPr id="3" name="Content Placeholder 2">
+            <a:extLst>
+              <a:ext uri="{FF2B5EF4-FFF2-40B4-BE49-F238E27FC236}">
+                <a16:creationId xmlns:a16="http://schemas.microsoft.com/office/drawing/2014/main" id="{BF24EC81-AB7E-515F-98DB-93AD57E028A1}"/>
+              </a:ext>
+            </a:extLst>
+          </p:cNvPr>
+          <p:cNvSpPr>
+            <a:spLocks noGrp="1"/>
+          </p:cNvSpPr>
+          <p:nvPr>
+            <p:ph idx="1"/>
+          </p:nvPr>
+        </p:nvSpPr>
+        <p:spPr>
+          <a:xfrm>
+            <a:off x="838200" y="408214"/>
+            <a:ext cx="10515600" cy="5768749"/>
+          </a:xfrm>
+        </p:spPr>
+        <p:txBody>
+          <a:bodyPr/>
+          <a:lstStyle/>
+          <a:p>
+            <a:r>
+              <a:rPr lang="en-US" dirty="0"/>
+              <a:t>Resources</a:t>
+            </a:r>
+            <a:r>
+              <a:rPr lang="en-GB" dirty="0"/>
+              <a:t>	</a:t>
+            </a:r>
+            <a:endParaRPr lang="en-GB" b="1" dirty="0"/>
+          </a:p>
+          <a:p>
+            <a:pPr lvl="1"/>
+            <a:r>
+              <a:rPr lang="en-GB" sz="1800" dirty="0"/>
+              <a:t>CLR via C#4 by Jeffrey Richter</a:t>
+            </a:r>
+          </a:p>
+          <a:p>
+            <a:pPr lvl="1"/>
+            <a:r>
+              <a:rPr lang="en-US" sz="1800" dirty="0"/>
+              <a:t>Stephen Toub (Partner Software Engineer)</a:t>
+            </a:r>
+          </a:p>
+          <a:p>
+            <a:pPr lvl="2"/>
+            <a:r>
+              <a:rPr lang="en-GB" sz="1800" dirty="0">
+                <a:hlinkClick r:id="rId2"/>
+              </a:rPr>
+              <a:t>Performance Improvements in .NET 7 - .NET Blog</a:t>
+            </a:r>
+            <a:endParaRPr lang="en-GB" sz="1800" dirty="0">
+              <a:hlinkClick r:id="rId3"/>
+            </a:endParaRPr>
+          </a:p>
+          <a:p>
+            <a:pPr lvl="2"/>
+            <a:r>
+              <a:rPr lang="en-GB" sz="1800" dirty="0">
+                <a:hlinkClick r:id="rId3"/>
+              </a:rPr>
+              <a:t>Performance Improvements in .NET 8 - .NET Blog</a:t>
+            </a:r>
+            <a:endParaRPr lang="en-GB" sz="1800" dirty="0"/>
+          </a:p>
+          <a:p>
+            <a:pPr lvl="2"/>
+            <a:r>
+              <a:rPr lang="en-GB" sz="1800" dirty="0">
+                <a:hlinkClick r:id="rId4"/>
+              </a:rPr>
+              <a:t>Performance Improvements in .NET 9 - .NET Blog</a:t>
+            </a:r>
+            <a:endParaRPr lang="en-GB" sz="1800" dirty="0"/>
+          </a:p>
+          <a:p>
+            <a:pPr lvl="1"/>
+            <a:r>
+              <a:rPr lang="en-US" sz="1800" dirty="0">
+                <a:hlinkClick r:id="rId5"/>
+              </a:rPr>
+              <a:t>#122 Matt Warren, How the .NET Runtime Has Changed | no dogma podcast</a:t>
+            </a:r>
+            <a:endParaRPr lang="en-US" sz="1800" dirty="0"/>
+          </a:p>
+          <a:p>
+            <a:pPr lvl="1"/>
+            <a:r>
+              <a:rPr lang="en-GB" sz="1800" dirty="0"/>
+              <a:t>Writing High-Performance .NET Code</a:t>
+            </a:r>
+            <a:r>
+              <a:rPr lang="en-US" sz="1800" dirty="0"/>
+              <a:t> – Ben Watson</a:t>
+            </a:r>
+          </a:p>
+          <a:p>
+            <a:pPr lvl="1"/>
+            <a:r>
+              <a:rPr lang="en-US" sz="1800" dirty="0"/>
+              <a:t>High Performance .NET: Recipes and Thoughts for .NET 8, 9, and C# 12, 13 - Armen Melkumyan</a:t>
+            </a:r>
+          </a:p>
+          <a:p>
+            <a:pPr lvl="1"/>
+            <a:endParaRPr lang="en-GB" dirty="0"/>
+          </a:p>
+          <a:p>
+            <a:pPr lvl="1"/>
+            <a:r>
+              <a:rPr lang="en-GB" dirty="0" err="1"/>
+              <a:t>Zlinq</a:t>
+            </a:r>
+            <a:endParaRPr lang="en-GB" dirty="0"/>
+          </a:p>
+          <a:p>
+            <a:pPr lvl="1"/>
+            <a:r>
+              <a:rPr lang="en-GB" sz="1600" dirty="0">
+                <a:hlinkClick r:id="rId6"/>
+              </a:rPr>
+              <a:t>https://github.com/Cysharp/ZLinq</a:t>
+            </a:r>
+            <a:endParaRPr lang="en-GB" sz="1600" dirty="0"/>
+          </a:p>
+          <a:p>
+            <a:pPr lvl="1"/>
+            <a:r>
+              <a:rPr lang="en-GB" sz="1600" dirty="0">
+                <a:hlinkClick r:id="rId7"/>
+              </a:rPr>
+              <a:t>https://www.nuget.org/packages/ZLinq</a:t>
+            </a:r>
+            <a:endParaRPr lang="en-GB" sz="1600" dirty="0"/>
+          </a:p>
+          <a:p>
+            <a:pPr lvl="1"/>
+            <a:endParaRPr lang="en-GB" dirty="0"/>
+          </a:p>
+          <a:p>
+            <a:pPr lvl="1"/>
+            <a:endParaRPr lang="en-GB" dirty="0"/>
+          </a:p>
+        </p:txBody>
+      </p:sp>
+    </p:spTree>
+    <p:extLst>
+      <p:ext uri="{BB962C8B-B14F-4D97-AF65-F5344CB8AC3E}">
+        <p14:creationId xmlns:p14="http://schemas.microsoft.com/office/powerpoint/2010/main" val="1725615428"/>
+      </p:ext>
+    </p:extLst>
+  </p:cSld>
+  <p:clrMapOvr>
+    <a:masterClrMapping/>
+  </p:clrMapOvr>
+</p:sld>
+</file>
+
 <file path=ppt/slides/slide2.xml><?xml version="1.0" encoding="utf-8"?>
 <p:sld xmlns:a="http://schemas.openxmlformats.org/drawingml/2006/main" xmlns:r="http://schemas.openxmlformats.org/officeDocument/2006/relationships" xmlns:p="http://schemas.openxmlformats.org/presentationml/2006/main">
   <p:cSld>
@@ -3978,46 +4161,12 @@
           <a:chExt cx="0" cy="0"/>
         </a:xfrm>
       </p:grpSpPr>
-      <p:sp>
-        <p:nvSpPr>
-          <p:cNvPr id="2" name="Title 1">
-            <a:extLst>
-              <a:ext uri="{FF2B5EF4-FFF2-40B4-BE49-F238E27FC236}">
-                <a16:creationId xmlns:a16="http://schemas.microsoft.com/office/drawing/2014/main" id="{82E4613B-9D5C-C5A3-6B4F-5FFEF12E99F5}"/>
-              </a:ext>
-            </a:extLst>
-          </p:cNvPr>
-          <p:cNvSpPr>
-            <a:spLocks noGrp="1"/>
-          </p:cNvSpPr>
-          <p:nvPr>
-            <p:ph type="title"/>
-          </p:nvPr>
-        </p:nvSpPr>
-        <p:spPr>
-          <a:xfrm>
-            <a:off x="307258" y="226142"/>
-            <a:ext cx="10515600" cy="766916"/>
-          </a:xfrm>
-        </p:spPr>
-        <p:txBody>
-          <a:bodyPr/>
-          <a:lstStyle/>
-          <a:p>
-            <a:r>
-              <a:rPr lang="en-US" dirty="0"/>
-              <a:t>Fast code is ugly code</a:t>
-            </a:r>
-            <a:endParaRPr lang="en-GB" dirty="0"/>
-          </a:p>
-        </p:txBody>
-      </p:sp>
       <p:pic>
         <p:nvPicPr>
-          <p:cNvPr id="5" name="Picture 4">
-            <a:extLst>
-              <a:ext uri="{FF2B5EF4-FFF2-40B4-BE49-F238E27FC236}">
-                <a16:creationId xmlns:a16="http://schemas.microsoft.com/office/drawing/2014/main" id="{227145AF-98B4-493B-4365-8DA9D3EBB04C}"/>
+          <p:cNvPr id="5" name="Picture 4" descr="A diagram of a graph&#10;&#10;AI-generated content may be incorrect.">
+            <a:extLst>
+              <a:ext uri="{FF2B5EF4-FFF2-40B4-BE49-F238E27FC236}">
+                <a16:creationId xmlns:a16="http://schemas.microsoft.com/office/drawing/2014/main" id="{2A0074D2-3DF9-89F4-4911-369D034BF2C9}"/>
               </a:ext>
             </a:extLst>
           </p:cNvPr>
@@ -4034,8 +4183,1483 @@
         </p:blipFill>
         <p:spPr>
           <a:xfrm>
-            <a:off x="2395021" y="1199075"/>
-            <a:ext cx="7401958" cy="971686"/>
+            <a:off x="2583669" y="1595230"/>
+            <a:ext cx="7516274" cy="1552792"/>
+          </a:xfrm>
+          <a:prstGeom prst="rect">
+            <a:avLst/>
+          </a:prstGeom>
+        </p:spPr>
+      </p:pic>
+      <p:sp>
+        <p:nvSpPr>
+          <p:cNvPr id="6" name="TextBox 5">
+            <a:extLst>
+              <a:ext uri="{FF2B5EF4-FFF2-40B4-BE49-F238E27FC236}">
+                <a16:creationId xmlns:a16="http://schemas.microsoft.com/office/drawing/2014/main" id="{DC2FCC31-8B1B-CFAA-208C-EF524E3F2130}"/>
+              </a:ext>
+            </a:extLst>
+          </p:cNvPr>
+          <p:cNvSpPr txBox="1"/>
+          <p:nvPr/>
+        </p:nvSpPr>
+        <p:spPr>
+          <a:xfrm>
+            <a:off x="471949" y="265472"/>
+            <a:ext cx="10550012" cy="2031325"/>
+          </a:xfrm>
+          <a:prstGeom prst="rect">
+            <a:avLst/>
+          </a:prstGeom>
+          <a:noFill/>
+        </p:spPr>
+        <p:txBody>
+          <a:bodyPr wrap="square" rtlCol="0">
+            <a:spAutoFit/>
+          </a:bodyPr>
+          <a:lstStyle/>
+          <a:p>
+            <a:pPr marL="285750" indent="-285750">
+              <a:buFont typeface="Arial" panose="020B0604020202020204" pitchFamily="34" charset="0"/>
+              <a:buChar char="•"/>
+            </a:pPr>
+            <a:r>
+              <a:rPr lang="en-US" sz="2800" dirty="0"/>
+              <a:t>Generational garbage collector</a:t>
+            </a:r>
+          </a:p>
+          <a:p>
+            <a:pPr marL="742950" lvl="1" indent="-285750">
+              <a:buFont typeface="Arial" panose="020B0604020202020204" pitchFamily="34" charset="0"/>
+              <a:buChar char="•"/>
+            </a:pPr>
+            <a:r>
+              <a:rPr lang="en-US" sz="1400" dirty="0"/>
+              <a:t>Stages</a:t>
+            </a:r>
+          </a:p>
+          <a:p>
+            <a:pPr marL="1200150" lvl="2" indent="-285750">
+              <a:buFont typeface="Arial" panose="020B0604020202020204" pitchFamily="34" charset="0"/>
+              <a:buChar char="•"/>
+            </a:pPr>
+            <a:r>
+              <a:rPr lang="en-US" sz="1400" dirty="0"/>
+              <a:t>Mark</a:t>
+            </a:r>
+          </a:p>
+          <a:p>
+            <a:pPr marL="1200150" lvl="2" indent="-285750">
+              <a:buFont typeface="Arial" panose="020B0604020202020204" pitchFamily="34" charset="0"/>
+              <a:buChar char="•"/>
+            </a:pPr>
+            <a:r>
+              <a:rPr lang="en-US" sz="1400" dirty="0"/>
+              <a:t>Plan</a:t>
+            </a:r>
+          </a:p>
+          <a:p>
+            <a:pPr marL="1200150" lvl="2" indent="-285750">
+              <a:buFont typeface="Arial" panose="020B0604020202020204" pitchFamily="34" charset="0"/>
+              <a:buChar char="•"/>
+            </a:pPr>
+            <a:r>
+              <a:rPr lang="en-US" sz="1400" dirty="0"/>
+              <a:t>Compact? (survival rate more than 90%) =&gt; Sweep (free memory)</a:t>
+            </a:r>
+          </a:p>
+          <a:p>
+            <a:pPr marL="1200150" lvl="2" indent="-285750">
+              <a:buFont typeface="Arial" panose="020B0604020202020204" pitchFamily="34" charset="0"/>
+              <a:buChar char="•"/>
+            </a:pPr>
+            <a:r>
+              <a:rPr lang="en-US" sz="1400" dirty="0"/>
+              <a:t>Relocate</a:t>
+            </a:r>
+            <a:br>
+              <a:rPr lang="en-US" sz="2800" dirty="0"/>
+            </a:br>
+            <a:endParaRPr lang="en-GB" sz="2800" dirty="0"/>
+          </a:p>
+        </p:txBody>
+      </p:sp>
+      <p:sp>
+        <p:nvSpPr>
+          <p:cNvPr id="7" name="Rectangle 6">
+            <a:extLst>
+              <a:ext uri="{FF2B5EF4-FFF2-40B4-BE49-F238E27FC236}">
+                <a16:creationId xmlns:a16="http://schemas.microsoft.com/office/drawing/2014/main" id="{A8DC1FAD-E199-42B8-6669-7748CDF4CDA1}"/>
+              </a:ext>
+            </a:extLst>
+          </p:cNvPr>
+          <p:cNvSpPr/>
+          <p:nvPr/>
+        </p:nvSpPr>
+        <p:spPr>
+          <a:xfrm>
+            <a:off x="668593" y="4643806"/>
+            <a:ext cx="4837471" cy="1823883"/>
+          </a:xfrm>
+          <a:prstGeom prst="rect">
+            <a:avLst/>
+          </a:prstGeom>
+          <a:solidFill>
+            <a:schemeClr val="bg1"/>
+          </a:solidFill>
+        </p:spPr>
+        <p:style>
+          <a:lnRef idx="2">
+            <a:schemeClr val="accent1">
+              <a:shade val="15000"/>
+            </a:schemeClr>
+          </a:lnRef>
+          <a:fillRef idx="1">
+            <a:schemeClr val="accent1"/>
+          </a:fillRef>
+          <a:effectRef idx="0">
+            <a:schemeClr val="accent1"/>
+          </a:effectRef>
+          <a:fontRef idx="minor">
+            <a:schemeClr val="lt1"/>
+          </a:fontRef>
+        </p:style>
+        <p:txBody>
+          <a:bodyPr rtlCol="0" anchor="ctr"/>
+          <a:lstStyle/>
+          <a:p>
+            <a:pPr algn="ctr"/>
+            <a:endParaRPr lang="en-GB"/>
+          </a:p>
+        </p:txBody>
+      </p:sp>
+      <p:sp>
+        <p:nvSpPr>
+          <p:cNvPr id="8" name="Rectangle 7">
+            <a:extLst>
+              <a:ext uri="{FF2B5EF4-FFF2-40B4-BE49-F238E27FC236}">
+                <a16:creationId xmlns:a16="http://schemas.microsoft.com/office/drawing/2014/main" id="{55557449-B0DC-264F-883D-C39A51E6924D}"/>
+              </a:ext>
+            </a:extLst>
+          </p:cNvPr>
+          <p:cNvSpPr/>
+          <p:nvPr/>
+        </p:nvSpPr>
+        <p:spPr>
+          <a:xfrm>
+            <a:off x="6459792" y="4643805"/>
+            <a:ext cx="4837471" cy="1823883"/>
+          </a:xfrm>
+          <a:prstGeom prst="rect">
+            <a:avLst/>
+          </a:prstGeom>
+          <a:solidFill>
+            <a:schemeClr val="bg1"/>
+          </a:solidFill>
+        </p:spPr>
+        <p:style>
+          <a:lnRef idx="2">
+            <a:schemeClr val="accent1">
+              <a:shade val="15000"/>
+            </a:schemeClr>
+          </a:lnRef>
+          <a:fillRef idx="1">
+            <a:schemeClr val="accent1"/>
+          </a:fillRef>
+          <a:effectRef idx="0">
+            <a:schemeClr val="accent1"/>
+          </a:effectRef>
+          <a:fontRef idx="minor">
+            <a:schemeClr val="lt1"/>
+          </a:fontRef>
+        </p:style>
+        <p:txBody>
+          <a:bodyPr rtlCol="0" anchor="ctr"/>
+          <a:lstStyle/>
+          <a:p>
+            <a:pPr algn="ctr"/>
+            <a:endParaRPr lang="en-GB"/>
+          </a:p>
+        </p:txBody>
+      </p:sp>
+      <p:sp>
+        <p:nvSpPr>
+          <p:cNvPr id="10" name="TextBox 9">
+            <a:extLst>
+              <a:ext uri="{FF2B5EF4-FFF2-40B4-BE49-F238E27FC236}">
+                <a16:creationId xmlns:a16="http://schemas.microsoft.com/office/drawing/2014/main" id="{F83FEEA8-A092-7D79-E13C-A2909ABC1E5E}"/>
+              </a:ext>
+            </a:extLst>
+          </p:cNvPr>
+          <p:cNvSpPr txBox="1"/>
+          <p:nvPr/>
+        </p:nvSpPr>
+        <p:spPr>
+          <a:xfrm>
+            <a:off x="1256621" y="5153221"/>
+            <a:ext cx="807529" cy="369332"/>
+          </a:xfrm>
+          <a:prstGeom prst="rect">
+            <a:avLst/>
+          </a:prstGeom>
+          <a:noFill/>
+        </p:spPr>
+        <p:txBody>
+          <a:bodyPr wrap="none" rtlCol="0">
+            <a:spAutoFit/>
+          </a:bodyPr>
+          <a:lstStyle/>
+          <a:p>
+            <a:r>
+              <a:rPr lang="en-US" dirty="0" err="1"/>
+              <a:t>sArray</a:t>
+            </a:r>
+            <a:endParaRPr lang="en-GB" dirty="0"/>
+          </a:p>
+        </p:txBody>
+      </p:sp>
+      <p:sp>
+        <p:nvSpPr>
+          <p:cNvPr id="15" name="TextBox 14">
+            <a:extLst>
+              <a:ext uri="{FF2B5EF4-FFF2-40B4-BE49-F238E27FC236}">
+                <a16:creationId xmlns:a16="http://schemas.microsoft.com/office/drawing/2014/main" id="{6E830BEF-B714-291E-644F-C8BD636449A0}"/>
+              </a:ext>
+            </a:extLst>
+          </p:cNvPr>
+          <p:cNvSpPr txBox="1"/>
+          <p:nvPr/>
+        </p:nvSpPr>
+        <p:spPr>
+          <a:xfrm>
+            <a:off x="1256621" y="4799641"/>
+            <a:ext cx="730434" cy="369332"/>
+          </a:xfrm>
+          <a:prstGeom prst="rect">
+            <a:avLst/>
+          </a:prstGeom>
+          <a:noFill/>
+        </p:spPr>
+        <p:txBody>
+          <a:bodyPr wrap="square" rtlCol="0">
+            <a:spAutoFit/>
+          </a:bodyPr>
+          <a:lstStyle/>
+          <a:p>
+            <a:r>
+              <a:rPr lang="en-US" dirty="0"/>
+              <a:t>line</a:t>
+            </a:r>
+            <a:endParaRPr lang="en-GB" dirty="0"/>
+          </a:p>
+        </p:txBody>
+      </p:sp>
+      <p:sp>
+        <p:nvSpPr>
+          <p:cNvPr id="16" name="TextBox 15">
+            <a:extLst>
+              <a:ext uri="{FF2B5EF4-FFF2-40B4-BE49-F238E27FC236}">
+                <a16:creationId xmlns:a16="http://schemas.microsoft.com/office/drawing/2014/main" id="{625095EF-9A60-54D5-3248-C16D0EECBF29}"/>
+              </a:ext>
+            </a:extLst>
+          </p:cNvPr>
+          <p:cNvSpPr txBox="1"/>
+          <p:nvPr/>
+        </p:nvSpPr>
+        <p:spPr>
+          <a:xfrm>
+            <a:off x="1277735" y="5516691"/>
+            <a:ext cx="324464" cy="369332"/>
+          </a:xfrm>
+          <a:prstGeom prst="rect">
+            <a:avLst/>
+          </a:prstGeom>
+          <a:noFill/>
+        </p:spPr>
+        <p:txBody>
+          <a:bodyPr wrap="square" rtlCol="0">
+            <a:spAutoFit/>
+          </a:bodyPr>
+          <a:lstStyle/>
+          <a:p>
+            <a:r>
+              <a:rPr lang="en-US" dirty="0"/>
+              <a:t>t</a:t>
+            </a:r>
+            <a:endParaRPr lang="en-GB" dirty="0"/>
+          </a:p>
+        </p:txBody>
+      </p:sp>
+      <p:sp>
+        <p:nvSpPr>
+          <p:cNvPr id="18" name="TextBox 17">
+            <a:extLst>
+              <a:ext uri="{FF2B5EF4-FFF2-40B4-BE49-F238E27FC236}">
+                <a16:creationId xmlns:a16="http://schemas.microsoft.com/office/drawing/2014/main" id="{37263588-F0B4-753D-52C9-E43A37477CD6}"/>
+              </a:ext>
+            </a:extLst>
+          </p:cNvPr>
+          <p:cNvSpPr txBox="1"/>
+          <p:nvPr/>
+        </p:nvSpPr>
+        <p:spPr>
+          <a:xfrm>
+            <a:off x="1286107" y="5909326"/>
+            <a:ext cx="1051891" cy="369332"/>
+          </a:xfrm>
+          <a:prstGeom prst="rect">
+            <a:avLst/>
+          </a:prstGeom>
+          <a:noFill/>
+        </p:spPr>
+        <p:txBody>
+          <a:bodyPr wrap="none" rtlCol="0">
+            <a:spAutoFit/>
+          </a:bodyPr>
+          <a:lstStyle/>
+          <a:p>
+            <a:r>
+              <a:rPr lang="en-US" dirty="0"/>
+              <a:t>segment</a:t>
+            </a:r>
+            <a:endParaRPr lang="en-GB" dirty="0"/>
+          </a:p>
+        </p:txBody>
+      </p:sp>
+      <p:sp>
+        <p:nvSpPr>
+          <p:cNvPr id="19" name="Rectangle 18">
+            <a:extLst>
+              <a:ext uri="{FF2B5EF4-FFF2-40B4-BE49-F238E27FC236}">
+                <a16:creationId xmlns:a16="http://schemas.microsoft.com/office/drawing/2014/main" id="{852E2D87-EE2C-62BA-3317-26A2AEDBD95E}"/>
+              </a:ext>
+            </a:extLst>
+          </p:cNvPr>
+          <p:cNvSpPr/>
+          <p:nvPr/>
+        </p:nvSpPr>
+        <p:spPr>
+          <a:xfrm>
+            <a:off x="2333725" y="4828067"/>
+            <a:ext cx="3112407" cy="306617"/>
+          </a:xfrm>
+          <a:prstGeom prst="rect">
+            <a:avLst/>
+          </a:prstGeom>
+          <a:solidFill>
+            <a:schemeClr val="bg1"/>
+          </a:solidFill>
+        </p:spPr>
+        <p:style>
+          <a:lnRef idx="2">
+            <a:schemeClr val="accent1">
+              <a:shade val="15000"/>
+            </a:schemeClr>
+          </a:lnRef>
+          <a:fillRef idx="1">
+            <a:schemeClr val="accent1"/>
+          </a:fillRef>
+          <a:effectRef idx="0">
+            <a:schemeClr val="accent1"/>
+          </a:effectRef>
+          <a:fontRef idx="minor">
+            <a:schemeClr val="lt1"/>
+          </a:fontRef>
+        </p:style>
+        <p:txBody>
+          <a:bodyPr rtlCol="0" anchor="ctr"/>
+          <a:lstStyle/>
+          <a:p>
+            <a:pPr algn="ctr"/>
+            <a:r>
+              <a:rPr lang="en-US" dirty="0">
+                <a:solidFill>
+                  <a:schemeClr val="tx1"/>
+                </a:solidFill>
+              </a:rPr>
+              <a:t>Ref</a:t>
+            </a:r>
+            <a:endParaRPr lang="en-GB" dirty="0">
+              <a:solidFill>
+                <a:schemeClr val="tx1"/>
+              </a:solidFill>
+            </a:endParaRPr>
+          </a:p>
+        </p:txBody>
+      </p:sp>
+      <p:sp>
+        <p:nvSpPr>
+          <p:cNvPr id="20" name="Rectangle 19">
+            <a:extLst>
+              <a:ext uri="{FF2B5EF4-FFF2-40B4-BE49-F238E27FC236}">
+                <a16:creationId xmlns:a16="http://schemas.microsoft.com/office/drawing/2014/main" id="{00A630D7-89FD-B2B9-02BF-5F4D0EA7559E}"/>
+              </a:ext>
+            </a:extLst>
+          </p:cNvPr>
+          <p:cNvSpPr/>
+          <p:nvPr/>
+        </p:nvSpPr>
+        <p:spPr>
+          <a:xfrm>
+            <a:off x="2327156" y="5245479"/>
+            <a:ext cx="1051551" cy="306617"/>
+          </a:xfrm>
+          <a:prstGeom prst="rect">
+            <a:avLst/>
+          </a:prstGeom>
+          <a:solidFill>
+            <a:schemeClr val="bg1"/>
+          </a:solidFill>
+        </p:spPr>
+        <p:style>
+          <a:lnRef idx="2">
+            <a:schemeClr val="accent1">
+              <a:shade val="15000"/>
+            </a:schemeClr>
+          </a:lnRef>
+          <a:fillRef idx="1">
+            <a:schemeClr val="accent1"/>
+          </a:fillRef>
+          <a:effectRef idx="0">
+            <a:schemeClr val="accent1"/>
+          </a:effectRef>
+          <a:fontRef idx="minor">
+            <a:schemeClr val="lt1"/>
+          </a:fontRef>
+        </p:style>
+        <p:txBody>
+          <a:bodyPr rtlCol="0" anchor="ctr"/>
+          <a:lstStyle/>
+          <a:p>
+            <a:pPr algn="ctr"/>
+            <a:r>
+              <a:rPr lang="en-US" dirty="0">
+                <a:solidFill>
+                  <a:schemeClr val="tx1"/>
+                </a:solidFill>
+              </a:rPr>
+              <a:t>Ref</a:t>
+            </a:r>
+            <a:endParaRPr lang="en-GB" dirty="0">
+              <a:solidFill>
+                <a:schemeClr val="tx1"/>
+              </a:solidFill>
+            </a:endParaRPr>
+          </a:p>
+        </p:txBody>
+      </p:sp>
+      <p:sp>
+        <p:nvSpPr>
+          <p:cNvPr id="21" name="Rectangle 20">
+            <a:extLst>
+              <a:ext uri="{FF2B5EF4-FFF2-40B4-BE49-F238E27FC236}">
+                <a16:creationId xmlns:a16="http://schemas.microsoft.com/office/drawing/2014/main" id="{67D6FB59-C876-1FAA-9531-4D03370C1204}"/>
+              </a:ext>
+            </a:extLst>
+          </p:cNvPr>
+          <p:cNvSpPr/>
+          <p:nvPr/>
+        </p:nvSpPr>
+        <p:spPr>
+          <a:xfrm>
+            <a:off x="2327664" y="5585837"/>
+            <a:ext cx="1051551" cy="306617"/>
+          </a:xfrm>
+          <a:prstGeom prst="rect">
+            <a:avLst/>
+          </a:prstGeom>
+          <a:solidFill>
+            <a:schemeClr val="bg1"/>
+          </a:solidFill>
+        </p:spPr>
+        <p:style>
+          <a:lnRef idx="2">
+            <a:schemeClr val="accent1">
+              <a:shade val="15000"/>
+            </a:schemeClr>
+          </a:lnRef>
+          <a:fillRef idx="1">
+            <a:schemeClr val="accent1"/>
+          </a:fillRef>
+          <a:effectRef idx="0">
+            <a:schemeClr val="accent1"/>
+          </a:effectRef>
+          <a:fontRef idx="minor">
+            <a:schemeClr val="lt1"/>
+          </a:fontRef>
+        </p:style>
+        <p:txBody>
+          <a:bodyPr rtlCol="0" anchor="ctr"/>
+          <a:lstStyle/>
+          <a:p>
+            <a:pPr algn="ctr"/>
+            <a:r>
+              <a:rPr lang="en-US" dirty="0">
+                <a:solidFill>
+                  <a:schemeClr val="tx1"/>
+                </a:solidFill>
+              </a:rPr>
+              <a:t>60</a:t>
+            </a:r>
+            <a:endParaRPr lang="en-GB" dirty="0">
+              <a:solidFill>
+                <a:schemeClr val="tx1"/>
+              </a:solidFill>
+            </a:endParaRPr>
+          </a:p>
+        </p:txBody>
+      </p:sp>
+      <p:sp>
+        <p:nvSpPr>
+          <p:cNvPr id="22" name="Rectangle 21">
+            <a:extLst>
+              <a:ext uri="{FF2B5EF4-FFF2-40B4-BE49-F238E27FC236}">
+                <a16:creationId xmlns:a16="http://schemas.microsoft.com/office/drawing/2014/main" id="{7383DF79-ED65-CB86-9DE8-2A4250C99474}"/>
+              </a:ext>
+            </a:extLst>
+          </p:cNvPr>
+          <p:cNvSpPr/>
+          <p:nvPr/>
+        </p:nvSpPr>
+        <p:spPr>
+          <a:xfrm>
+            <a:off x="2333725" y="5937753"/>
+            <a:ext cx="1051551" cy="306617"/>
+          </a:xfrm>
+          <a:prstGeom prst="rect">
+            <a:avLst/>
+          </a:prstGeom>
+          <a:solidFill>
+            <a:schemeClr val="bg1"/>
+          </a:solidFill>
+        </p:spPr>
+        <p:style>
+          <a:lnRef idx="2">
+            <a:schemeClr val="accent1">
+              <a:shade val="15000"/>
+            </a:schemeClr>
+          </a:lnRef>
+          <a:fillRef idx="1">
+            <a:schemeClr val="accent1"/>
+          </a:fillRef>
+          <a:effectRef idx="0">
+            <a:schemeClr val="accent1"/>
+          </a:effectRef>
+          <a:fontRef idx="minor">
+            <a:schemeClr val="lt1"/>
+          </a:fontRef>
+        </p:style>
+        <p:txBody>
+          <a:bodyPr rtlCol="0" anchor="ctr"/>
+          <a:lstStyle/>
+          <a:p>
+            <a:pPr algn="ctr"/>
+            <a:r>
+              <a:rPr lang="en-US" dirty="0">
+                <a:solidFill>
+                  <a:schemeClr val="tx1"/>
+                </a:solidFill>
+              </a:rPr>
+              <a:t>Ref</a:t>
+            </a:r>
+            <a:endParaRPr lang="en-GB" dirty="0">
+              <a:solidFill>
+                <a:schemeClr val="tx1"/>
+              </a:solidFill>
+            </a:endParaRPr>
+          </a:p>
+        </p:txBody>
+      </p:sp>
+      <p:sp>
+        <p:nvSpPr>
+          <p:cNvPr id="23" name="Rectangle 22">
+            <a:extLst>
+              <a:ext uri="{FF2B5EF4-FFF2-40B4-BE49-F238E27FC236}">
+                <a16:creationId xmlns:a16="http://schemas.microsoft.com/office/drawing/2014/main" id="{9A90A728-7BD3-4FDB-DBA9-A535FF61BB66}"/>
+              </a:ext>
+            </a:extLst>
+          </p:cNvPr>
+          <p:cNvSpPr/>
+          <p:nvPr/>
+        </p:nvSpPr>
+        <p:spPr>
+          <a:xfrm>
+            <a:off x="7024208" y="4827926"/>
+            <a:ext cx="3685555" cy="306617"/>
+          </a:xfrm>
+          <a:prstGeom prst="rect">
+            <a:avLst/>
+          </a:prstGeom>
+          <a:solidFill>
+            <a:schemeClr val="bg1"/>
+          </a:solidFill>
+        </p:spPr>
+        <p:style>
+          <a:lnRef idx="2">
+            <a:schemeClr val="accent1">
+              <a:shade val="15000"/>
+            </a:schemeClr>
+          </a:lnRef>
+          <a:fillRef idx="1">
+            <a:schemeClr val="accent1"/>
+          </a:fillRef>
+          <a:effectRef idx="0">
+            <a:schemeClr val="accent1"/>
+          </a:effectRef>
+          <a:fontRef idx="minor">
+            <a:schemeClr val="lt1"/>
+          </a:fontRef>
+        </p:style>
+        <p:txBody>
+          <a:bodyPr rtlCol="0" anchor="ctr"/>
+          <a:lstStyle/>
+          <a:p>
+            <a:pPr algn="ctr"/>
+            <a:r>
+              <a:rPr lang="en-US" dirty="0">
+                <a:solidFill>
+                  <a:schemeClr val="tx1"/>
+                </a:solidFill>
+              </a:rPr>
+              <a:t>10,20,30</a:t>
+            </a:r>
+            <a:endParaRPr lang="en-GB" dirty="0">
+              <a:solidFill>
+                <a:schemeClr val="tx1"/>
+              </a:solidFill>
+            </a:endParaRPr>
+          </a:p>
+        </p:txBody>
+      </p:sp>
+      <p:sp>
+        <p:nvSpPr>
+          <p:cNvPr id="24" name="TextBox 23">
+            <a:extLst>
+              <a:ext uri="{FF2B5EF4-FFF2-40B4-BE49-F238E27FC236}">
+                <a16:creationId xmlns:a16="http://schemas.microsoft.com/office/drawing/2014/main" id="{60726B42-B40B-F18E-A5B4-60163C26CED9}"/>
+              </a:ext>
+            </a:extLst>
+          </p:cNvPr>
+          <p:cNvSpPr txBox="1"/>
+          <p:nvPr/>
+        </p:nvSpPr>
+        <p:spPr>
+          <a:xfrm rot="5400000">
+            <a:off x="524634" y="5371081"/>
+            <a:ext cx="746423" cy="369332"/>
+          </a:xfrm>
+          <a:prstGeom prst="rect">
+            <a:avLst/>
+          </a:prstGeom>
+          <a:noFill/>
+        </p:spPr>
+        <p:txBody>
+          <a:bodyPr wrap="none" rtlCol="0">
+            <a:spAutoFit/>
+          </a:bodyPr>
+          <a:lstStyle/>
+          <a:p>
+            <a:r>
+              <a:rPr lang="en-US" dirty="0"/>
+              <a:t>Stack</a:t>
+            </a:r>
+            <a:endParaRPr lang="en-GB" dirty="0"/>
+          </a:p>
+        </p:txBody>
+      </p:sp>
+      <p:sp>
+        <p:nvSpPr>
+          <p:cNvPr id="25" name="TextBox 24">
+            <a:extLst>
+              <a:ext uri="{FF2B5EF4-FFF2-40B4-BE49-F238E27FC236}">
+                <a16:creationId xmlns:a16="http://schemas.microsoft.com/office/drawing/2014/main" id="{279E98D8-EB30-0706-6C2B-F1F205789C66}"/>
+              </a:ext>
+            </a:extLst>
+          </p:cNvPr>
+          <p:cNvSpPr txBox="1"/>
+          <p:nvPr/>
+        </p:nvSpPr>
+        <p:spPr>
+          <a:xfrm rot="5400000">
+            <a:off x="10750959" y="5332408"/>
+            <a:ext cx="723275" cy="369332"/>
+          </a:xfrm>
+          <a:prstGeom prst="rect">
+            <a:avLst/>
+          </a:prstGeom>
+          <a:noFill/>
+        </p:spPr>
+        <p:txBody>
+          <a:bodyPr wrap="none" rtlCol="0">
+            <a:spAutoFit/>
+          </a:bodyPr>
+          <a:lstStyle/>
+          <a:p>
+            <a:r>
+              <a:rPr lang="en-US" dirty="0"/>
+              <a:t>Heap</a:t>
+            </a:r>
+            <a:endParaRPr lang="en-GB" dirty="0"/>
+          </a:p>
+        </p:txBody>
+      </p:sp>
+      <p:sp>
+        <p:nvSpPr>
+          <p:cNvPr id="26" name="Rectangle 25">
+            <a:extLst>
+              <a:ext uri="{FF2B5EF4-FFF2-40B4-BE49-F238E27FC236}">
+                <a16:creationId xmlns:a16="http://schemas.microsoft.com/office/drawing/2014/main" id="{5969F0E3-5C95-C15F-E3FB-94528D3492AD}"/>
+              </a:ext>
+            </a:extLst>
+          </p:cNvPr>
+          <p:cNvSpPr/>
+          <p:nvPr/>
+        </p:nvSpPr>
+        <p:spPr>
+          <a:xfrm>
+            <a:off x="7032521" y="5249129"/>
+            <a:ext cx="3685555" cy="306617"/>
+          </a:xfrm>
+          <a:prstGeom prst="rect">
+            <a:avLst/>
+          </a:prstGeom>
+          <a:solidFill>
+            <a:schemeClr val="bg1"/>
+          </a:solidFill>
+        </p:spPr>
+        <p:style>
+          <a:lnRef idx="2">
+            <a:schemeClr val="accent1">
+              <a:shade val="15000"/>
+            </a:schemeClr>
+          </a:lnRef>
+          <a:fillRef idx="1">
+            <a:schemeClr val="accent1"/>
+          </a:fillRef>
+          <a:effectRef idx="0">
+            <a:schemeClr val="accent1"/>
+          </a:effectRef>
+          <a:fontRef idx="minor">
+            <a:schemeClr val="lt1"/>
+          </a:fontRef>
+        </p:style>
+        <p:txBody>
+          <a:bodyPr rtlCol="0" anchor="ctr"/>
+          <a:lstStyle/>
+          <a:p>
+            <a:pPr algn="ctr"/>
+            <a:endParaRPr lang="en-GB">
+              <a:solidFill>
+                <a:schemeClr val="tx1"/>
+              </a:solidFill>
+            </a:endParaRPr>
+          </a:p>
+        </p:txBody>
+      </p:sp>
+      <p:sp>
+        <p:nvSpPr>
+          <p:cNvPr id="27" name="Rectangle 26">
+            <a:extLst>
+              <a:ext uri="{FF2B5EF4-FFF2-40B4-BE49-F238E27FC236}">
+                <a16:creationId xmlns:a16="http://schemas.microsoft.com/office/drawing/2014/main" id="{B8400413-162B-590D-8C69-F36B01A9DDE1}"/>
+              </a:ext>
+            </a:extLst>
+          </p:cNvPr>
+          <p:cNvSpPr/>
+          <p:nvPr/>
+        </p:nvSpPr>
+        <p:spPr>
+          <a:xfrm>
+            <a:off x="9733446" y="5866524"/>
+            <a:ext cx="1023803" cy="306617"/>
+          </a:xfrm>
+          <a:prstGeom prst="rect">
+            <a:avLst/>
+          </a:prstGeom>
+          <a:solidFill>
+            <a:schemeClr val="bg1"/>
+          </a:solidFill>
+        </p:spPr>
+        <p:style>
+          <a:lnRef idx="2">
+            <a:schemeClr val="accent1">
+              <a:shade val="15000"/>
+            </a:schemeClr>
+          </a:lnRef>
+          <a:fillRef idx="1">
+            <a:schemeClr val="accent1"/>
+          </a:fillRef>
+          <a:effectRef idx="0">
+            <a:schemeClr val="accent1"/>
+          </a:effectRef>
+          <a:fontRef idx="minor">
+            <a:schemeClr val="lt1"/>
+          </a:fontRef>
+        </p:style>
+        <p:txBody>
+          <a:bodyPr rtlCol="0" anchor="ctr"/>
+          <a:lstStyle/>
+          <a:p>
+            <a:pPr algn="ctr"/>
+            <a:r>
+              <a:rPr lang="en-US" dirty="0">
+                <a:solidFill>
+                  <a:schemeClr val="tx1"/>
+                </a:solidFill>
+              </a:rPr>
+              <a:t>30</a:t>
+            </a:r>
+            <a:endParaRPr lang="en-GB" dirty="0">
+              <a:solidFill>
+                <a:schemeClr val="tx1"/>
+              </a:solidFill>
+            </a:endParaRPr>
+          </a:p>
+        </p:txBody>
+      </p:sp>
+      <p:sp>
+        <p:nvSpPr>
+          <p:cNvPr id="28" name="Rectangle 27">
+            <a:extLst>
+              <a:ext uri="{FF2B5EF4-FFF2-40B4-BE49-F238E27FC236}">
+                <a16:creationId xmlns:a16="http://schemas.microsoft.com/office/drawing/2014/main" id="{08212839-CC53-4AC2-E408-011A5F277688}"/>
+              </a:ext>
+            </a:extLst>
+          </p:cNvPr>
+          <p:cNvSpPr/>
+          <p:nvPr/>
+        </p:nvSpPr>
+        <p:spPr>
+          <a:xfrm>
+            <a:off x="8467605" y="5884456"/>
+            <a:ext cx="1023802" cy="306617"/>
+          </a:xfrm>
+          <a:prstGeom prst="rect">
+            <a:avLst/>
+          </a:prstGeom>
+          <a:solidFill>
+            <a:schemeClr val="bg1"/>
+          </a:solidFill>
+        </p:spPr>
+        <p:style>
+          <a:lnRef idx="2">
+            <a:schemeClr val="accent1">
+              <a:shade val="15000"/>
+            </a:schemeClr>
+          </a:lnRef>
+          <a:fillRef idx="1">
+            <a:schemeClr val="accent1"/>
+          </a:fillRef>
+          <a:effectRef idx="0">
+            <a:schemeClr val="accent1"/>
+          </a:effectRef>
+          <a:fontRef idx="minor">
+            <a:schemeClr val="lt1"/>
+          </a:fontRef>
+        </p:style>
+        <p:txBody>
+          <a:bodyPr rtlCol="0" anchor="ctr"/>
+          <a:lstStyle/>
+          <a:p>
+            <a:pPr algn="ctr"/>
+            <a:r>
+              <a:rPr lang="en-US" dirty="0">
+                <a:solidFill>
+                  <a:schemeClr val="tx1"/>
+                </a:solidFill>
+              </a:rPr>
+              <a:t>20</a:t>
+            </a:r>
+            <a:endParaRPr lang="en-GB" dirty="0">
+              <a:solidFill>
+                <a:schemeClr val="tx1"/>
+              </a:solidFill>
+            </a:endParaRPr>
+          </a:p>
+        </p:txBody>
+      </p:sp>
+      <p:sp>
+        <p:nvSpPr>
+          <p:cNvPr id="29" name="Rectangle 28">
+            <a:extLst>
+              <a:ext uri="{FF2B5EF4-FFF2-40B4-BE49-F238E27FC236}">
+                <a16:creationId xmlns:a16="http://schemas.microsoft.com/office/drawing/2014/main" id="{7F0FA95F-0E62-BCA7-72F6-75EA61C2897F}"/>
+              </a:ext>
+            </a:extLst>
+          </p:cNvPr>
+          <p:cNvSpPr/>
+          <p:nvPr/>
+        </p:nvSpPr>
+        <p:spPr>
+          <a:xfrm>
+            <a:off x="7064163" y="5884456"/>
+            <a:ext cx="988456" cy="306617"/>
+          </a:xfrm>
+          <a:prstGeom prst="rect">
+            <a:avLst/>
+          </a:prstGeom>
+          <a:solidFill>
+            <a:schemeClr val="bg1"/>
+          </a:solidFill>
+        </p:spPr>
+        <p:style>
+          <a:lnRef idx="2">
+            <a:schemeClr val="accent1">
+              <a:shade val="15000"/>
+            </a:schemeClr>
+          </a:lnRef>
+          <a:fillRef idx="1">
+            <a:schemeClr val="accent1"/>
+          </a:fillRef>
+          <a:effectRef idx="0">
+            <a:schemeClr val="accent1"/>
+          </a:effectRef>
+          <a:fontRef idx="minor">
+            <a:schemeClr val="lt1"/>
+          </a:fontRef>
+        </p:style>
+        <p:txBody>
+          <a:bodyPr rtlCol="0" anchor="ctr"/>
+          <a:lstStyle/>
+          <a:p>
+            <a:pPr algn="ctr"/>
+            <a:r>
+              <a:rPr lang="en-US" dirty="0">
+                <a:solidFill>
+                  <a:schemeClr val="tx1"/>
+                </a:solidFill>
+              </a:rPr>
+              <a:t>10</a:t>
+            </a:r>
+            <a:endParaRPr lang="en-GB" dirty="0">
+              <a:solidFill>
+                <a:schemeClr val="tx1"/>
+              </a:solidFill>
+            </a:endParaRPr>
+          </a:p>
+        </p:txBody>
+      </p:sp>
+      <p:pic>
+        <p:nvPicPr>
+          <p:cNvPr id="31" name="Picture 30" descr="A white background with black text&#10;&#10;AI-generated content may be incorrect.">
+            <a:extLst>
+              <a:ext uri="{FF2B5EF4-FFF2-40B4-BE49-F238E27FC236}">
+                <a16:creationId xmlns:a16="http://schemas.microsoft.com/office/drawing/2014/main" id="{F734F053-E743-030F-95E3-9DF14061E39B}"/>
+              </a:ext>
+            </a:extLst>
+          </p:cNvPr>
+          <p:cNvPicPr>
+            <a:picLocks noChangeAspect="1"/>
+          </p:cNvPicPr>
+          <p:nvPr/>
+        </p:nvPicPr>
+        <p:blipFill>
+          <a:blip r:embed="rId3"/>
+          <a:stretch>
+            <a:fillRect/>
+          </a:stretch>
+        </p:blipFill>
+        <p:spPr>
+          <a:xfrm>
+            <a:off x="3393765" y="3030848"/>
+            <a:ext cx="6177313" cy="1389603"/>
+          </a:xfrm>
+          <a:prstGeom prst="rect">
+            <a:avLst/>
+          </a:prstGeom>
+        </p:spPr>
+      </p:pic>
+      <p:sp>
+        <p:nvSpPr>
+          <p:cNvPr id="32" name="Rectangle 31">
+            <a:extLst>
+              <a:ext uri="{FF2B5EF4-FFF2-40B4-BE49-F238E27FC236}">
+                <a16:creationId xmlns:a16="http://schemas.microsoft.com/office/drawing/2014/main" id="{3AEC1C83-F244-AF34-3426-A4080A699D1F}"/>
+              </a:ext>
+            </a:extLst>
+          </p:cNvPr>
+          <p:cNvSpPr/>
+          <p:nvPr/>
+        </p:nvSpPr>
+        <p:spPr>
+          <a:xfrm>
+            <a:off x="9571078" y="5249129"/>
+            <a:ext cx="1155312" cy="306618"/>
+          </a:xfrm>
+          <a:prstGeom prst="rect">
+            <a:avLst/>
+          </a:prstGeom>
+          <a:solidFill>
+            <a:schemeClr val="bg1"/>
+          </a:solidFill>
+        </p:spPr>
+        <p:style>
+          <a:lnRef idx="2">
+            <a:schemeClr val="accent1">
+              <a:shade val="15000"/>
+            </a:schemeClr>
+          </a:lnRef>
+          <a:fillRef idx="1">
+            <a:schemeClr val="accent1"/>
+          </a:fillRef>
+          <a:effectRef idx="0">
+            <a:schemeClr val="accent1"/>
+          </a:effectRef>
+          <a:fontRef idx="minor">
+            <a:schemeClr val="lt1"/>
+          </a:fontRef>
+        </p:style>
+        <p:txBody>
+          <a:bodyPr rtlCol="0" anchor="ctr"/>
+          <a:lstStyle/>
+          <a:p>
+            <a:pPr algn="ctr"/>
+            <a:r>
+              <a:rPr lang="en-US" dirty="0">
+                <a:solidFill>
+                  <a:schemeClr val="tx1"/>
+                </a:solidFill>
+              </a:rPr>
+              <a:t>30</a:t>
+            </a:r>
+            <a:endParaRPr lang="en-GB" dirty="0">
+              <a:solidFill>
+                <a:schemeClr val="tx1"/>
+              </a:solidFill>
+            </a:endParaRPr>
+          </a:p>
+        </p:txBody>
+      </p:sp>
+      <p:sp>
+        <p:nvSpPr>
+          <p:cNvPr id="33" name="Rectangle 32">
+            <a:extLst>
+              <a:ext uri="{FF2B5EF4-FFF2-40B4-BE49-F238E27FC236}">
+                <a16:creationId xmlns:a16="http://schemas.microsoft.com/office/drawing/2014/main" id="{9DA1C807-4AD7-AA94-5565-487D491F7A68}"/>
+              </a:ext>
+            </a:extLst>
+          </p:cNvPr>
+          <p:cNvSpPr/>
+          <p:nvPr/>
+        </p:nvSpPr>
+        <p:spPr>
+          <a:xfrm>
+            <a:off x="8347586" y="5249934"/>
+            <a:ext cx="1215178" cy="306617"/>
+          </a:xfrm>
+          <a:prstGeom prst="rect">
+            <a:avLst/>
+          </a:prstGeom>
+          <a:solidFill>
+            <a:schemeClr val="bg1"/>
+          </a:solidFill>
+        </p:spPr>
+        <p:style>
+          <a:lnRef idx="2">
+            <a:schemeClr val="accent1">
+              <a:shade val="15000"/>
+            </a:schemeClr>
+          </a:lnRef>
+          <a:fillRef idx="1">
+            <a:schemeClr val="accent1"/>
+          </a:fillRef>
+          <a:effectRef idx="0">
+            <a:schemeClr val="accent1"/>
+          </a:effectRef>
+          <a:fontRef idx="minor">
+            <a:schemeClr val="lt1"/>
+          </a:fontRef>
+        </p:style>
+        <p:txBody>
+          <a:bodyPr rtlCol="0" anchor="ctr"/>
+          <a:lstStyle/>
+          <a:p>
+            <a:pPr algn="ctr"/>
+            <a:r>
+              <a:rPr lang="en-US" dirty="0">
+                <a:solidFill>
+                  <a:schemeClr val="tx1"/>
+                </a:solidFill>
+              </a:rPr>
+              <a:t>20</a:t>
+            </a:r>
+            <a:endParaRPr lang="en-GB" dirty="0">
+              <a:solidFill>
+                <a:schemeClr val="tx1"/>
+              </a:solidFill>
+            </a:endParaRPr>
+          </a:p>
+        </p:txBody>
+      </p:sp>
+      <p:sp>
+        <p:nvSpPr>
+          <p:cNvPr id="34" name="Rectangle 33">
+            <a:extLst>
+              <a:ext uri="{FF2B5EF4-FFF2-40B4-BE49-F238E27FC236}">
+                <a16:creationId xmlns:a16="http://schemas.microsoft.com/office/drawing/2014/main" id="{15B428D0-1766-FE36-7168-33EF01934316}"/>
+              </a:ext>
+            </a:extLst>
+          </p:cNvPr>
+          <p:cNvSpPr/>
+          <p:nvPr/>
+        </p:nvSpPr>
+        <p:spPr>
+          <a:xfrm>
+            <a:off x="7024207" y="5249129"/>
+            <a:ext cx="1323379" cy="306617"/>
+          </a:xfrm>
+          <a:prstGeom prst="rect">
+            <a:avLst/>
+          </a:prstGeom>
+          <a:solidFill>
+            <a:schemeClr val="bg1"/>
+          </a:solidFill>
+        </p:spPr>
+        <p:style>
+          <a:lnRef idx="2">
+            <a:schemeClr val="accent1">
+              <a:shade val="15000"/>
+            </a:schemeClr>
+          </a:lnRef>
+          <a:fillRef idx="1">
+            <a:schemeClr val="accent1"/>
+          </a:fillRef>
+          <a:effectRef idx="0">
+            <a:schemeClr val="accent1"/>
+          </a:effectRef>
+          <a:fontRef idx="minor">
+            <a:schemeClr val="lt1"/>
+          </a:fontRef>
+        </p:style>
+        <p:txBody>
+          <a:bodyPr rtlCol="0" anchor="ctr"/>
+          <a:lstStyle/>
+          <a:p>
+            <a:pPr algn="ctr"/>
+            <a:r>
+              <a:rPr lang="en-US" dirty="0">
+                <a:solidFill>
+                  <a:schemeClr val="tx1"/>
+                </a:solidFill>
+              </a:rPr>
+              <a:t>10</a:t>
+            </a:r>
+            <a:endParaRPr lang="en-GB" dirty="0">
+              <a:solidFill>
+                <a:schemeClr val="tx1"/>
+              </a:solidFill>
+            </a:endParaRPr>
+          </a:p>
+        </p:txBody>
+      </p:sp>
+      <p:cxnSp>
+        <p:nvCxnSpPr>
+          <p:cNvPr id="36" name="Straight Arrow Connector 35">
+            <a:extLst>
+              <a:ext uri="{FF2B5EF4-FFF2-40B4-BE49-F238E27FC236}">
+                <a16:creationId xmlns:a16="http://schemas.microsoft.com/office/drawing/2014/main" id="{DDC40657-8DD7-1C7E-734B-40956A6ACB23}"/>
+              </a:ext>
+            </a:extLst>
+          </p:cNvPr>
+          <p:cNvCxnSpPr>
+            <a:cxnSpLocks/>
+            <a:stCxn id="19" idx="3"/>
+            <a:endCxn id="23" idx="1"/>
+          </p:cNvCxnSpPr>
+          <p:nvPr/>
+        </p:nvCxnSpPr>
+        <p:spPr>
+          <a:xfrm flipV="1">
+            <a:off x="5446132" y="4981235"/>
+            <a:ext cx="1578076" cy="141"/>
+          </a:xfrm>
+          <a:prstGeom prst="straightConnector1">
+            <a:avLst/>
+          </a:prstGeom>
+          <a:ln w="34925">
+            <a:solidFill>
+              <a:schemeClr val="tx1"/>
+            </a:solidFill>
+            <a:prstDash val="sysDot"/>
+            <a:tailEnd type="triangle" w="lg" len="med"/>
+          </a:ln>
+        </p:spPr>
+        <p:style>
+          <a:lnRef idx="2">
+            <a:schemeClr val="accent1"/>
+          </a:lnRef>
+          <a:fillRef idx="0">
+            <a:schemeClr val="accent1"/>
+          </a:fillRef>
+          <a:effectRef idx="1">
+            <a:schemeClr val="accent1"/>
+          </a:effectRef>
+          <a:fontRef idx="minor">
+            <a:schemeClr val="tx1"/>
+          </a:fontRef>
+        </p:style>
+      </p:cxnSp>
+      <p:cxnSp>
+        <p:nvCxnSpPr>
+          <p:cNvPr id="39" name="Straight Arrow Connector 38">
+            <a:extLst>
+              <a:ext uri="{FF2B5EF4-FFF2-40B4-BE49-F238E27FC236}">
+                <a16:creationId xmlns:a16="http://schemas.microsoft.com/office/drawing/2014/main" id="{2E3E007A-2435-9BBF-5DD5-F0BDED4A5BD6}"/>
+              </a:ext>
+            </a:extLst>
+          </p:cNvPr>
+          <p:cNvCxnSpPr>
+            <a:cxnSpLocks/>
+            <a:stCxn id="20" idx="3"/>
+            <a:endCxn id="34" idx="1"/>
+          </p:cNvCxnSpPr>
+          <p:nvPr/>
+        </p:nvCxnSpPr>
+        <p:spPr>
+          <a:xfrm>
+            <a:off x="3378707" y="5398788"/>
+            <a:ext cx="3645500" cy="3650"/>
+          </a:xfrm>
+          <a:prstGeom prst="straightConnector1">
+            <a:avLst/>
+          </a:prstGeom>
+          <a:ln w="34925">
+            <a:solidFill>
+              <a:schemeClr val="tx1"/>
+            </a:solidFill>
+            <a:prstDash val="sysDot"/>
+            <a:tailEnd type="triangle" w="lg" len="med"/>
+          </a:ln>
+        </p:spPr>
+        <p:style>
+          <a:lnRef idx="2">
+            <a:schemeClr val="accent1"/>
+          </a:lnRef>
+          <a:fillRef idx="0">
+            <a:schemeClr val="accent1"/>
+          </a:fillRef>
+          <a:effectRef idx="1">
+            <a:schemeClr val="accent1"/>
+          </a:effectRef>
+          <a:fontRef idx="minor">
+            <a:schemeClr val="tx1"/>
+          </a:fontRef>
+        </p:style>
+      </p:cxnSp>
+      <p:cxnSp>
+        <p:nvCxnSpPr>
+          <p:cNvPr id="42" name="Straight Arrow Connector 41">
+            <a:extLst>
+              <a:ext uri="{FF2B5EF4-FFF2-40B4-BE49-F238E27FC236}">
+                <a16:creationId xmlns:a16="http://schemas.microsoft.com/office/drawing/2014/main" id="{9E87D0E5-6AAF-8B71-011B-742FBDFA7BE1}"/>
+              </a:ext>
+            </a:extLst>
+          </p:cNvPr>
+          <p:cNvCxnSpPr>
+            <a:cxnSpLocks/>
+            <a:endCxn id="27" idx="1"/>
+          </p:cNvCxnSpPr>
+          <p:nvPr/>
+        </p:nvCxnSpPr>
+        <p:spPr>
+          <a:xfrm flipV="1">
+            <a:off x="3385275" y="6019833"/>
+            <a:ext cx="6348171" cy="54357"/>
+          </a:xfrm>
+          <a:prstGeom prst="straightConnector1">
+            <a:avLst/>
+          </a:prstGeom>
+          <a:ln w="34925">
+            <a:solidFill>
+              <a:schemeClr val="tx1"/>
+            </a:solidFill>
+            <a:prstDash val="sysDot"/>
+            <a:tailEnd type="triangle" w="lg" len="med"/>
+          </a:ln>
+        </p:spPr>
+        <p:style>
+          <a:lnRef idx="2">
+            <a:schemeClr val="accent1"/>
+          </a:lnRef>
+          <a:fillRef idx="0">
+            <a:schemeClr val="accent1"/>
+          </a:fillRef>
+          <a:effectRef idx="1">
+            <a:schemeClr val="accent1"/>
+          </a:effectRef>
+          <a:fontRef idx="minor">
+            <a:schemeClr val="tx1"/>
+          </a:fontRef>
+        </p:style>
+      </p:cxnSp>
+      <p:cxnSp>
+        <p:nvCxnSpPr>
+          <p:cNvPr id="47" name="Connector: Elbow 46">
+            <a:extLst>
+              <a:ext uri="{FF2B5EF4-FFF2-40B4-BE49-F238E27FC236}">
+                <a16:creationId xmlns:a16="http://schemas.microsoft.com/office/drawing/2014/main" id="{2A44AEBC-233A-48F8-EBA7-2363FB576FF1}"/>
+              </a:ext>
+            </a:extLst>
+          </p:cNvPr>
+          <p:cNvCxnSpPr>
+            <a:cxnSpLocks/>
+          </p:cNvCxnSpPr>
+          <p:nvPr/>
+        </p:nvCxnSpPr>
+        <p:spPr>
+          <a:xfrm rot="16200000" flipH="1">
+            <a:off x="9105041" y="3145462"/>
+            <a:ext cx="2122541" cy="865732"/>
+          </a:xfrm>
+          <a:prstGeom prst="bentConnector3">
+            <a:avLst>
+              <a:gd name="adj1" fmla="val -492"/>
+            </a:avLst>
+          </a:prstGeom>
+          <a:ln>
+            <a:solidFill>
+              <a:schemeClr val="tx1"/>
+            </a:solidFill>
+            <a:tailEnd type="triangle"/>
+          </a:ln>
+        </p:spPr>
+        <p:style>
+          <a:lnRef idx="2">
+            <a:schemeClr val="accent1"/>
+          </a:lnRef>
+          <a:fillRef idx="0">
+            <a:schemeClr val="accent1"/>
+          </a:fillRef>
+          <a:effectRef idx="1">
+            <a:schemeClr val="accent1"/>
+          </a:effectRef>
+          <a:fontRef idx="minor">
+            <a:schemeClr val="tx1"/>
+          </a:fontRef>
+        </p:style>
+      </p:cxnSp>
+    </p:spTree>
+    <p:extLst>
+      <p:ext uri="{BB962C8B-B14F-4D97-AF65-F5344CB8AC3E}">
+        <p14:creationId xmlns:p14="http://schemas.microsoft.com/office/powerpoint/2010/main" val="1752173251"/>
+      </p:ext>
+    </p:extLst>
+  </p:cSld>
+  <p:clrMapOvr>
+    <a:masterClrMapping/>
+  </p:clrMapOvr>
+</p:sld>
+</file>
+
+<file path=ppt/slides/slide3.xml><?xml version="1.0" encoding="utf-8"?>
+<p:sld xmlns:a="http://schemas.openxmlformats.org/drawingml/2006/main" xmlns:r="http://schemas.openxmlformats.org/officeDocument/2006/relationships" xmlns:p="http://schemas.openxmlformats.org/presentationml/2006/main">
+  <p:cSld>
+    <p:bg>
+      <p:bgPr>
+        <a:gradFill>
+          <a:gsLst>
+            <a:gs pos="0">
+              <a:schemeClr val="accent1">
+                <a:lumMod val="5000"/>
+                <a:lumOff val="95000"/>
+              </a:schemeClr>
+            </a:gs>
+            <a:gs pos="74000">
+              <a:schemeClr val="accent1">
+                <a:lumMod val="45000"/>
+                <a:lumOff val="55000"/>
+              </a:schemeClr>
+            </a:gs>
+            <a:gs pos="83000">
+              <a:schemeClr val="accent1">
+                <a:lumMod val="45000"/>
+                <a:lumOff val="55000"/>
+              </a:schemeClr>
+            </a:gs>
+            <a:gs pos="100000">
+              <a:schemeClr val="accent1">
+                <a:lumMod val="30000"/>
+                <a:lumOff val="70000"/>
+              </a:schemeClr>
+            </a:gs>
+          </a:gsLst>
+          <a:lin ang="5400000" scaled="1"/>
+        </a:gradFill>
+        <a:effectLst/>
+      </p:bgPr>
+    </p:bg>
+    <p:spTree>
+      <p:nvGrpSpPr>
+        <p:cNvPr id="1" name=""/>
+        <p:cNvGrpSpPr/>
+        <p:nvPr/>
+      </p:nvGrpSpPr>
+      <p:grpSpPr>
+        <a:xfrm>
+          <a:off x="0" y="0"/>
+          <a:ext cx="0" cy="0"/>
+          <a:chOff x="0" y="0"/>
+          <a:chExt cx="0" cy="0"/>
+        </a:xfrm>
+      </p:grpSpPr>
+      <p:sp>
+        <p:nvSpPr>
+          <p:cNvPr id="2" name="Title 1">
+            <a:extLst>
+              <a:ext uri="{FF2B5EF4-FFF2-40B4-BE49-F238E27FC236}">
+                <a16:creationId xmlns:a16="http://schemas.microsoft.com/office/drawing/2014/main" id="{82E4613B-9D5C-C5A3-6B4F-5FFEF12E99F5}"/>
+              </a:ext>
+            </a:extLst>
+          </p:cNvPr>
+          <p:cNvSpPr>
+            <a:spLocks noGrp="1"/>
+          </p:cNvSpPr>
+          <p:nvPr>
+            <p:ph type="title"/>
+          </p:nvPr>
+        </p:nvSpPr>
+        <p:spPr>
+          <a:xfrm>
+            <a:off x="307258" y="226142"/>
+            <a:ext cx="10515600" cy="766916"/>
+          </a:xfrm>
+        </p:spPr>
+        <p:txBody>
+          <a:bodyPr/>
+          <a:lstStyle/>
+          <a:p>
+            <a:r>
+              <a:rPr lang="en-US" dirty="0"/>
+              <a:t>Fast code is ugly code</a:t>
+            </a:r>
+            <a:endParaRPr lang="en-GB" dirty="0"/>
+          </a:p>
+        </p:txBody>
+      </p:sp>
+      <p:pic>
+        <p:nvPicPr>
+          <p:cNvPr id="5" name="Picture 4">
+            <a:extLst>
+              <a:ext uri="{FF2B5EF4-FFF2-40B4-BE49-F238E27FC236}">
+                <a16:creationId xmlns:a16="http://schemas.microsoft.com/office/drawing/2014/main" id="{227145AF-98B4-493B-4365-8DA9D3EBB04C}"/>
+              </a:ext>
+            </a:extLst>
+          </p:cNvPr>
+          <p:cNvPicPr>
+            <a:picLocks noChangeAspect="1"/>
+          </p:cNvPicPr>
+          <p:nvPr/>
+        </p:nvPicPr>
+        <p:blipFill>
+          <a:blip r:embed="rId2"/>
+          <a:stretch>
+            <a:fillRect/>
+          </a:stretch>
+        </p:blipFill>
+        <p:spPr>
+          <a:xfrm>
+            <a:off x="1730477" y="1148686"/>
+            <a:ext cx="8347588" cy="1022075"/>
           </a:xfrm>
           <a:prstGeom prst="rect">
             <a:avLst/>
@@ -4243,7 +5867,7 @@
         </p:blipFill>
         <p:spPr>
           <a:xfrm>
-            <a:off x="663803" y="2244462"/>
+            <a:off x="663803" y="2170761"/>
             <a:ext cx="4801270" cy="2172003"/>
           </a:xfrm>
           <a:prstGeom prst="rect">
@@ -4255,278 +5879,6 @@
     <p:extLst>
       <p:ext uri="{BB962C8B-B14F-4D97-AF65-F5344CB8AC3E}">
         <p14:creationId xmlns:p14="http://schemas.microsoft.com/office/powerpoint/2010/main" val="1048772992"/>
-      </p:ext>
-    </p:extLst>
-  </p:cSld>
-  <p:clrMapOvr>
-    <a:masterClrMapping/>
-  </p:clrMapOvr>
-</p:sld>
-</file>
-
-<file path=ppt/slides/slide3.xml><?xml version="1.0" encoding="utf-8"?>
-<p:sld xmlns:a="http://schemas.openxmlformats.org/drawingml/2006/main" xmlns:r="http://schemas.openxmlformats.org/officeDocument/2006/relationships" xmlns:p="http://schemas.openxmlformats.org/presentationml/2006/main">
-  <p:cSld>
-    <p:spTree>
-      <p:nvGrpSpPr>
-        <p:cNvPr id="1" name=""/>
-        <p:cNvGrpSpPr/>
-        <p:nvPr/>
-      </p:nvGrpSpPr>
-      <p:grpSpPr>
-        <a:xfrm>
-          <a:off x="0" y="0"/>
-          <a:ext cx="0" cy="0"/>
-          <a:chOff x="0" y="0"/>
-          <a:chExt cx="0" cy="0"/>
-        </a:xfrm>
-      </p:grpSpPr>
-      <p:sp>
-        <p:nvSpPr>
-          <p:cNvPr id="3" name="Content Placeholder 2">
-            <a:extLst>
-              <a:ext uri="{FF2B5EF4-FFF2-40B4-BE49-F238E27FC236}">
-                <a16:creationId xmlns:a16="http://schemas.microsoft.com/office/drawing/2014/main" id="{832AA2C5-3EC0-F90E-1A8B-88D4B9DBD1E5}"/>
-              </a:ext>
-            </a:extLst>
-          </p:cNvPr>
-          <p:cNvSpPr>
-            <a:spLocks noGrp="1"/>
-          </p:cNvSpPr>
-          <p:nvPr>
-            <p:ph idx="1"/>
-          </p:nvPr>
-        </p:nvSpPr>
-        <p:spPr>
-          <a:xfrm>
-            <a:off x="502890" y="1538466"/>
-            <a:ext cx="10515600" cy="4351338"/>
-          </a:xfrm>
-        </p:spPr>
-        <p:txBody>
-          <a:bodyPr>
-            <a:normAutofit fontScale="55000" lnSpcReduction="20000"/>
-          </a:bodyPr>
-          <a:lstStyle/>
-          <a:p>
-            <a:r>
-              <a:rPr lang="en-US" dirty="0"/>
-              <a:t>General advice</a:t>
-            </a:r>
-          </a:p>
-          <a:p>
-            <a:pPr lvl="1"/>
-            <a:r>
-              <a:rPr lang="en-US" dirty="0"/>
-              <a:t>Ensure all your code is testable</a:t>
-            </a:r>
-          </a:p>
-          <a:p>
-            <a:pPr lvl="2"/>
-            <a:r>
-              <a:rPr lang="en-US" dirty="0"/>
-              <a:t>Dependency injection -&gt; tests</a:t>
-            </a:r>
-          </a:p>
-          <a:p>
-            <a:pPr lvl="1"/>
-            <a:r>
-              <a:rPr lang="en-US" dirty="0"/>
-              <a:t>Benchmark before optimizations</a:t>
-            </a:r>
-          </a:p>
-          <a:p>
-            <a:pPr lvl="2"/>
-            <a:r>
-              <a:rPr lang="en-US" dirty="0"/>
-              <a:t>Measure before &amp; after</a:t>
-            </a:r>
-          </a:p>
-          <a:p>
-            <a:pPr lvl="1"/>
-            <a:r>
-              <a:rPr lang="en-US" dirty="0"/>
-              <a:t>Use the Result Pattern</a:t>
-            </a:r>
-          </a:p>
-          <a:p>
-            <a:pPr lvl="2"/>
-            <a:r>
-              <a:rPr lang="en-US" dirty="0"/>
-              <a:t>Only throw exceptions in extreme situations!</a:t>
-            </a:r>
-          </a:p>
-          <a:p>
-            <a:pPr lvl="1"/>
-            <a:r>
-              <a:rPr lang="en-US" dirty="0"/>
-              <a:t>Don’t parallelize unnecessarily</a:t>
-            </a:r>
-          </a:p>
-          <a:p>
-            <a:pPr lvl="1"/>
-            <a:r>
-              <a:rPr lang="en-GB" dirty="0"/>
-              <a:t>Read the documentation</a:t>
-            </a:r>
-          </a:p>
-          <a:p>
-            <a:pPr lvl="2"/>
-            <a:r>
-              <a:rPr lang="en-GB" dirty="0"/>
-              <a:t>Stephen Toub’s blog posts</a:t>
-            </a:r>
-          </a:p>
-          <a:p>
-            <a:pPr lvl="3"/>
-            <a:r>
-              <a:rPr lang="en-GB" dirty="0"/>
-              <a:t>Tiered compilation</a:t>
-            </a:r>
-          </a:p>
-          <a:p>
-            <a:pPr lvl="3"/>
-            <a:r>
-              <a:rPr lang="en-GB" dirty="0"/>
-              <a:t>Frozen dictionary</a:t>
-            </a:r>
-          </a:p>
-          <a:p>
-            <a:pPr lvl="3"/>
-            <a:r>
-              <a:rPr lang="en-GB" dirty="0"/>
-              <a:t>…</a:t>
-            </a:r>
-          </a:p>
-          <a:p>
-            <a:pPr lvl="1"/>
-            <a:r>
-              <a:rPr lang="en-GB" dirty="0"/>
-              <a:t>Best optimisations are DB/IO/Architecture</a:t>
-            </a:r>
-          </a:p>
-          <a:p>
-            <a:pPr lvl="2"/>
-            <a:r>
-              <a:rPr lang="en-GB" dirty="0"/>
-              <a:t>Micro-optimisations are the exception</a:t>
-            </a:r>
-          </a:p>
-          <a:p>
-            <a:pPr lvl="2"/>
-            <a:r>
-              <a:rPr lang="en-GB" dirty="0"/>
-              <a:t>Be careful micro-optimisation is addictive</a:t>
-            </a:r>
-          </a:p>
-          <a:p>
-            <a:pPr lvl="1"/>
-            <a:r>
-              <a:rPr lang="en-GB" dirty="0"/>
-              <a:t>Understand your tools</a:t>
-            </a:r>
-          </a:p>
-          <a:p>
-            <a:pPr lvl="2"/>
-            <a:r>
-              <a:rPr lang="en-GB" dirty="0" err="1"/>
-              <a:t>ILSpy</a:t>
-            </a:r>
-            <a:endParaRPr lang="en-GB" dirty="0"/>
-          </a:p>
-          <a:p>
-            <a:pPr lvl="2"/>
-            <a:r>
-              <a:rPr lang="en-GB" dirty="0"/>
-              <a:t>SharpLab.io</a:t>
-            </a:r>
-          </a:p>
-          <a:p>
-            <a:pPr lvl="2"/>
-            <a:r>
-              <a:rPr lang="en-GB" dirty="0"/>
-              <a:t>VS Performance Profiler</a:t>
-            </a:r>
-          </a:p>
-          <a:p>
-            <a:pPr lvl="2"/>
-            <a:r>
-              <a:rPr lang="en-GB" dirty="0"/>
-              <a:t>Dotnet-counters</a:t>
-            </a:r>
-          </a:p>
-        </p:txBody>
-      </p:sp>
-      <p:pic>
-        <p:nvPicPr>
-          <p:cNvPr id="5" name="Picture 4">
-            <a:extLst>
-              <a:ext uri="{FF2B5EF4-FFF2-40B4-BE49-F238E27FC236}">
-                <a16:creationId xmlns:a16="http://schemas.microsoft.com/office/drawing/2014/main" id="{B2598D3E-A876-8E63-001E-33CD078C89E0}"/>
-              </a:ext>
-            </a:extLst>
-          </p:cNvPr>
-          <p:cNvPicPr>
-            <a:picLocks noChangeAspect="1"/>
-          </p:cNvPicPr>
-          <p:nvPr/>
-        </p:nvPicPr>
-        <p:blipFill>
-          <a:blip r:embed="rId2"/>
-          <a:stretch>
-            <a:fillRect/>
-          </a:stretch>
-        </p:blipFill>
-        <p:spPr>
-          <a:xfrm>
-            <a:off x="6561939" y="1399237"/>
-            <a:ext cx="5630061" cy="4629796"/>
-          </a:xfrm>
-          <a:prstGeom prst="rect">
-            <a:avLst/>
-          </a:prstGeom>
-        </p:spPr>
-      </p:pic>
-      <p:sp>
-        <p:nvSpPr>
-          <p:cNvPr id="7" name="TextBox 6">
-            <a:extLst>
-              <a:ext uri="{FF2B5EF4-FFF2-40B4-BE49-F238E27FC236}">
-                <a16:creationId xmlns:a16="http://schemas.microsoft.com/office/drawing/2014/main" id="{89FBDF57-2D49-479C-0B76-B5E1A06ABF1F}"/>
-              </a:ext>
-            </a:extLst>
-          </p:cNvPr>
-          <p:cNvSpPr txBox="1"/>
-          <p:nvPr/>
-        </p:nvSpPr>
-        <p:spPr>
-          <a:xfrm>
-            <a:off x="718457" y="816429"/>
-            <a:ext cx="4804072" cy="369332"/>
-          </a:xfrm>
-          <a:prstGeom prst="rect">
-            <a:avLst/>
-          </a:prstGeom>
-          <a:noFill/>
-        </p:spPr>
-        <p:txBody>
-          <a:bodyPr wrap="none" rtlCol="0">
-            <a:spAutoFit/>
-          </a:bodyPr>
-          <a:lstStyle/>
-          <a:p>
-            <a:r>
-              <a:rPr lang="en-US" dirty="0"/>
-              <a:t>PRIMARY GOAL: REDUCE HEAP ALLOCATIONS</a:t>
-            </a:r>
-            <a:endParaRPr lang="en-GB" dirty="0"/>
-          </a:p>
-        </p:txBody>
-      </p:sp>
-    </p:spTree>
-    <p:extLst>
-      <p:ext uri="{BB962C8B-B14F-4D97-AF65-F5344CB8AC3E}">
-        <p14:creationId xmlns:p14="http://schemas.microsoft.com/office/powerpoint/2010/main" val="2064752394"/>
       </p:ext>
     </p:extLst>
   </p:cSld>
@@ -4553,12 +5905,241 @@
           <a:chExt cx="0" cy="0"/>
         </a:xfrm>
       </p:grpSpPr>
+      <p:sp>
+        <p:nvSpPr>
+          <p:cNvPr id="3" name="Content Placeholder 2">
+            <a:extLst>
+              <a:ext uri="{FF2B5EF4-FFF2-40B4-BE49-F238E27FC236}">
+                <a16:creationId xmlns:a16="http://schemas.microsoft.com/office/drawing/2014/main" id="{832AA2C5-3EC0-F90E-1A8B-88D4B9DBD1E5}"/>
+              </a:ext>
+            </a:extLst>
+          </p:cNvPr>
+          <p:cNvSpPr>
+            <a:spLocks noGrp="1"/>
+          </p:cNvSpPr>
+          <p:nvPr>
+            <p:ph idx="1"/>
+          </p:nvPr>
+        </p:nvSpPr>
+        <p:spPr>
+          <a:xfrm>
+            <a:off x="502890" y="1538466"/>
+            <a:ext cx="10515600" cy="4351338"/>
+          </a:xfrm>
+        </p:spPr>
+        <p:txBody>
+          <a:bodyPr>
+            <a:normAutofit fontScale="47500" lnSpcReduction="20000"/>
+          </a:bodyPr>
+          <a:lstStyle/>
+          <a:p>
+            <a:r>
+              <a:rPr lang="en-US" dirty="0"/>
+              <a:t>General advice</a:t>
+            </a:r>
+          </a:p>
+          <a:p>
+            <a:pPr lvl="1"/>
+            <a:r>
+              <a:rPr lang="en-US" dirty="0"/>
+              <a:t>Ensure all your code is testable</a:t>
+            </a:r>
+          </a:p>
+          <a:p>
+            <a:pPr lvl="2"/>
+            <a:r>
+              <a:rPr lang="en-US" dirty="0"/>
+              <a:t>Dependency injection -&gt; tests</a:t>
+            </a:r>
+          </a:p>
+          <a:p>
+            <a:pPr lvl="1"/>
+            <a:r>
+              <a:rPr lang="en-US" b="1" dirty="0"/>
+              <a:t>Understand your tools and settings (e.g. </a:t>
+            </a:r>
+            <a:r>
+              <a:rPr lang="en-US" b="1" dirty="0" err="1"/>
+              <a:t>Zlinq</a:t>
+            </a:r>
+            <a:r>
+              <a:rPr lang="en-US" b="1" dirty="0"/>
+              <a:t>, Span </a:t>
+            </a:r>
+            <a:r>
+              <a:rPr lang="en-US" b="1" dirty="0" err="1"/>
+              <a:t>etc</a:t>
+            </a:r>
+            <a:r>
+              <a:rPr lang="en-US" b="1" dirty="0"/>
+              <a:t>)</a:t>
+            </a:r>
+          </a:p>
+          <a:p>
+            <a:pPr lvl="1"/>
+            <a:r>
+              <a:rPr lang="en-US" dirty="0"/>
+              <a:t>Benchmark before optimizations</a:t>
+            </a:r>
+          </a:p>
+          <a:p>
+            <a:pPr lvl="2"/>
+            <a:r>
+              <a:rPr lang="en-US" dirty="0"/>
+              <a:t>Measure before &amp; after</a:t>
+            </a:r>
+          </a:p>
+          <a:p>
+            <a:pPr lvl="1"/>
+            <a:r>
+              <a:rPr lang="en-US" dirty="0"/>
+              <a:t>Use the Result Pattern</a:t>
+            </a:r>
+          </a:p>
+          <a:p>
+            <a:pPr lvl="2"/>
+            <a:r>
+              <a:rPr lang="en-US" dirty="0"/>
+              <a:t>Only throw exceptions in extreme situations!</a:t>
+            </a:r>
+          </a:p>
+          <a:p>
+            <a:pPr lvl="1"/>
+            <a:r>
+              <a:rPr lang="en-US" dirty="0"/>
+              <a:t>Don’t parallelize unnecessarily</a:t>
+            </a:r>
+          </a:p>
+          <a:p>
+            <a:pPr lvl="1"/>
+            <a:r>
+              <a:rPr lang="en-GB" dirty="0"/>
+              <a:t>Read the documentation</a:t>
+            </a:r>
+          </a:p>
+          <a:p>
+            <a:pPr lvl="2"/>
+            <a:r>
+              <a:rPr lang="en-GB" dirty="0"/>
+              <a:t>Stephen Toub’s blog posts</a:t>
+            </a:r>
+          </a:p>
+          <a:p>
+            <a:pPr lvl="3"/>
+            <a:r>
+              <a:rPr lang="en-GB" dirty="0"/>
+              <a:t>Tiered compilation</a:t>
+            </a:r>
+          </a:p>
+          <a:p>
+            <a:pPr lvl="3"/>
+            <a:r>
+              <a:rPr lang="en-GB" dirty="0"/>
+              <a:t>Frozen dictionary</a:t>
+            </a:r>
+          </a:p>
+          <a:p>
+            <a:pPr lvl="3"/>
+            <a:r>
+              <a:rPr lang="en-GB" dirty="0"/>
+              <a:t>…</a:t>
+            </a:r>
+          </a:p>
+          <a:p>
+            <a:pPr lvl="1"/>
+            <a:r>
+              <a:rPr lang="en-GB" dirty="0"/>
+              <a:t>Best optimisations are DB/IO/Architecture</a:t>
+            </a:r>
+          </a:p>
+          <a:p>
+            <a:pPr lvl="2"/>
+            <a:r>
+              <a:rPr lang="en-GB" dirty="0"/>
+              <a:t>Micro-optimisations are the exception</a:t>
+            </a:r>
+          </a:p>
+          <a:p>
+            <a:pPr lvl="2"/>
+            <a:r>
+              <a:rPr lang="en-GB" dirty="0"/>
+              <a:t>Be careful micro-optimisation is addictive</a:t>
+            </a:r>
+          </a:p>
+          <a:p>
+            <a:pPr lvl="1"/>
+            <a:r>
+              <a:rPr lang="en-GB" dirty="0"/>
+              <a:t>Understand your tools</a:t>
+            </a:r>
+          </a:p>
+          <a:p>
+            <a:pPr lvl="2"/>
+            <a:r>
+              <a:rPr lang="en-GB" dirty="0" err="1"/>
+              <a:t>ILSpy</a:t>
+            </a:r>
+            <a:endParaRPr lang="en-GB" dirty="0"/>
+          </a:p>
+          <a:p>
+            <a:pPr lvl="2"/>
+            <a:r>
+              <a:rPr lang="en-GB" dirty="0"/>
+              <a:t>SharpLab.io</a:t>
+            </a:r>
+          </a:p>
+          <a:p>
+            <a:pPr lvl="2"/>
+            <a:r>
+              <a:rPr lang="en-GB" dirty="0"/>
+              <a:t>VS Performance Profiler</a:t>
+            </a:r>
+          </a:p>
+          <a:p>
+            <a:pPr lvl="2"/>
+            <a:r>
+              <a:rPr lang="en-GB" dirty="0"/>
+              <a:t>Dotnet-counters</a:t>
+            </a:r>
+          </a:p>
+          <a:p>
+            <a:pPr lvl="1"/>
+            <a:r>
+              <a:rPr lang="en-GB" dirty="0"/>
+              <a:t>Update Dot Net Core Runtime when possible</a:t>
+            </a:r>
+          </a:p>
+          <a:p>
+            <a:pPr lvl="2"/>
+            <a:r>
+              <a:rPr lang="en-GB" dirty="0"/>
+              <a:t>Use Span, </a:t>
+            </a:r>
+            <a:r>
+              <a:rPr lang="en-GB" dirty="0" err="1"/>
+              <a:t>FronzenDictionary</a:t>
+            </a:r>
+            <a:r>
+              <a:rPr lang="en-GB" dirty="0"/>
+              <a:t> etc.</a:t>
+            </a:r>
+          </a:p>
+          <a:p>
+            <a:pPr lvl="2"/>
+            <a:endParaRPr lang="en-GB" dirty="0"/>
+          </a:p>
+          <a:p>
+            <a:pPr lvl="2"/>
+            <a:endParaRPr lang="en-GB" dirty="0"/>
+          </a:p>
+        </p:txBody>
+      </p:sp>
       <p:pic>
         <p:nvPicPr>
           <p:cNvPr id="5" name="Picture 4">
             <a:extLst>
               <a:ext uri="{FF2B5EF4-FFF2-40B4-BE49-F238E27FC236}">
-                <a16:creationId xmlns:a16="http://schemas.microsoft.com/office/drawing/2014/main" id="{C9F75E27-BEEB-5DB5-DD19-852845E4ABBC}"/>
+                <a16:creationId xmlns:a16="http://schemas.microsoft.com/office/drawing/2014/main" id="{B2598D3E-A876-8E63-001E-33CD078C89E0}"/>
               </a:ext>
             </a:extLst>
           </p:cNvPr>
@@ -4575,8 +6156,8 @@
         </p:blipFill>
         <p:spPr>
           <a:xfrm>
-            <a:off x="493885" y="1329534"/>
-            <a:ext cx="10234691" cy="4548752"/>
+            <a:off x="6561939" y="1399237"/>
+            <a:ext cx="5630061" cy="4629796"/>
           </a:xfrm>
           <a:prstGeom prst="rect">
             <a:avLst/>
@@ -4585,63 +6166,74 @@
       </p:pic>
       <p:sp>
         <p:nvSpPr>
-          <p:cNvPr id="10" name="Title 1">
-            <a:extLst>
-              <a:ext uri="{FF2B5EF4-FFF2-40B4-BE49-F238E27FC236}">
-                <a16:creationId xmlns:a16="http://schemas.microsoft.com/office/drawing/2014/main" id="{E33614DB-D050-F33F-DF89-C1B083DC16A6}"/>
-              </a:ext>
-            </a:extLst>
-          </p:cNvPr>
-          <p:cNvSpPr txBox="1">
-            <a:spLocks/>
-          </p:cNvSpPr>
+          <p:cNvPr id="7" name="TextBox 6">
+            <a:extLst>
+              <a:ext uri="{FF2B5EF4-FFF2-40B4-BE49-F238E27FC236}">
+                <a16:creationId xmlns:a16="http://schemas.microsoft.com/office/drawing/2014/main" id="{89FBDF57-2D49-479C-0B76-B5E1A06ABF1F}"/>
+              </a:ext>
+            </a:extLst>
+          </p:cNvPr>
+          <p:cNvSpPr txBox="1"/>
           <p:nvPr/>
         </p:nvSpPr>
         <p:spPr>
           <a:xfrm>
-            <a:off x="493886" y="281329"/>
-            <a:ext cx="7522029" cy="639990"/>
+            <a:off x="718457" y="816429"/>
+            <a:ext cx="4804072" cy="369332"/>
           </a:xfrm>
           <a:prstGeom prst="rect">
             <a:avLst/>
           </a:prstGeom>
-        </p:spPr>
-        <p:txBody>
-          <a:bodyPr vert="horz" lIns="91440" tIns="45720" rIns="91440" bIns="45720" rtlCol="0" anchor="ctr">
-            <a:normAutofit fontScale="90000" lnSpcReduction="10000"/>
+          <a:noFill/>
+        </p:spPr>
+        <p:txBody>
+          <a:bodyPr wrap="none" rtlCol="0">
+            <a:spAutoFit/>
           </a:bodyPr>
-          <a:lstStyle>
-            <a:lvl1pPr algn="l" defTabSz="914400" rtl="0" eaLnBrk="1" latinLnBrk="0" hangingPunct="1">
-              <a:lnSpc>
-                <a:spcPct val="90000"/>
-              </a:lnSpc>
-              <a:spcBef>
-                <a:spcPct val="0"/>
-              </a:spcBef>
-              <a:buNone/>
-              <a:defRPr sz="4400" kern="1200">
-                <a:solidFill>
-                  <a:schemeClr val="tx1"/>
-                </a:solidFill>
-                <a:latin typeface="+mj-lt"/>
-                <a:ea typeface="+mj-ea"/>
-                <a:cs typeface="+mj-cs"/>
-              </a:defRPr>
-            </a:lvl1pPr>
-          </a:lstStyle>
+          <a:lstStyle/>
           <a:p>
             <a:r>
               <a:rPr lang="en-US" dirty="0"/>
-              <a:t>IL Spy (Visual Studio Extension)</a:t>
+              <a:t>PRIMARY GOAL: REDUCE HEAP ALLOCATIONS</a:t>
             </a:r>
             <a:endParaRPr lang="en-GB" dirty="0"/>
           </a:p>
         </p:txBody>
       </p:sp>
+      <p:pic>
+        <p:nvPicPr>
+          <p:cNvPr id="4" name="Picture 3" descr="A graph of different colored columns&#10;&#10;AI-generated content may be incorrect.">
+            <a:extLst>
+              <a:ext uri="{FF2B5EF4-FFF2-40B4-BE49-F238E27FC236}">
+                <a16:creationId xmlns:a16="http://schemas.microsoft.com/office/drawing/2014/main" id="{659626EF-D852-381B-928F-1F280EFBB2EE}"/>
+              </a:ext>
+            </a:extLst>
+          </p:cNvPr>
+          <p:cNvPicPr>
+            <a:picLocks noChangeAspect="1"/>
+          </p:cNvPicPr>
+          <p:nvPr/>
+        </p:nvPicPr>
+        <p:blipFill>
+          <a:blip r:embed="rId3"/>
+          <a:stretch>
+            <a:fillRect/>
+          </a:stretch>
+        </p:blipFill>
+        <p:spPr>
+          <a:xfrm>
+            <a:off x="3824748" y="5435868"/>
+            <a:ext cx="2019883" cy="1186330"/>
+          </a:xfrm>
+          <a:prstGeom prst="rect">
+            <a:avLst/>
+          </a:prstGeom>
+        </p:spPr>
+      </p:pic>
     </p:spTree>
     <p:extLst>
       <p:ext uri="{BB962C8B-B14F-4D97-AF65-F5344CB8AC3E}">
-        <p14:creationId xmlns:p14="http://schemas.microsoft.com/office/powerpoint/2010/main" val="1316660053"/>
+        <p14:creationId xmlns:p14="http://schemas.microsoft.com/office/powerpoint/2010/main" val="2064752394"/>
       </p:ext>
     </p:extLst>
   </p:cSld>
@@ -4670,10 +6262,10 @@
       </p:grpSpPr>
       <p:pic>
         <p:nvPicPr>
-          <p:cNvPr id="5" name="Picture 4" descr="A screenshot of a computer screen&#10;&#10;AI-generated content may be incorrect.">
-            <a:extLst>
-              <a:ext uri="{FF2B5EF4-FFF2-40B4-BE49-F238E27FC236}">
-                <a16:creationId xmlns:a16="http://schemas.microsoft.com/office/drawing/2014/main" id="{2EC1C68A-2892-A245-B58B-9BECA4271562}"/>
+          <p:cNvPr id="5" name="Picture 4">
+            <a:extLst>
+              <a:ext uri="{FF2B5EF4-FFF2-40B4-BE49-F238E27FC236}">
+                <a16:creationId xmlns:a16="http://schemas.microsoft.com/office/drawing/2014/main" id="{C9F75E27-BEEB-5DB5-DD19-852845E4ABBC}"/>
               </a:ext>
             </a:extLst>
           </p:cNvPr>
@@ -4690,8 +6282,8 @@
         </p:blipFill>
         <p:spPr>
           <a:xfrm>
-            <a:off x="446358" y="1494399"/>
-            <a:ext cx="11560542" cy="4816257"/>
+            <a:off x="493885" y="1329534"/>
+            <a:ext cx="10234691" cy="4548752"/>
           </a:xfrm>
           <a:prstGeom prst="rect">
             <a:avLst/>
@@ -4700,10 +6292,10 @@
       </p:pic>
       <p:sp>
         <p:nvSpPr>
-          <p:cNvPr id="6" name="Title 1">
-            <a:extLst>
-              <a:ext uri="{FF2B5EF4-FFF2-40B4-BE49-F238E27FC236}">
-                <a16:creationId xmlns:a16="http://schemas.microsoft.com/office/drawing/2014/main" id="{57BFBF5F-0C94-943F-DE37-78953EE7A9CE}"/>
+          <p:cNvPr id="10" name="Title 1">
+            <a:extLst>
+              <a:ext uri="{FF2B5EF4-FFF2-40B4-BE49-F238E27FC236}">
+                <a16:creationId xmlns:a16="http://schemas.microsoft.com/office/drawing/2014/main" id="{E33614DB-D050-F33F-DF89-C1B083DC16A6}"/>
               </a:ext>
             </a:extLst>
           </p:cNvPr>
@@ -4747,7 +6339,7 @@
           <a:p>
             <a:r>
               <a:rPr lang="en-US" dirty="0"/>
-              <a:t>SharpLab.io</a:t>
+              <a:t>IL Spy (Visual Studio Extension)</a:t>
             </a:r>
             <a:endParaRPr lang="en-GB" dirty="0"/>
           </a:p>
@@ -4756,7 +6348,7 @@
     </p:spTree>
     <p:extLst>
       <p:ext uri="{BB962C8B-B14F-4D97-AF65-F5344CB8AC3E}">
-        <p14:creationId xmlns:p14="http://schemas.microsoft.com/office/powerpoint/2010/main" val="352101287"/>
+        <p14:creationId xmlns:p14="http://schemas.microsoft.com/office/powerpoint/2010/main" val="1316660053"/>
       </p:ext>
     </p:extLst>
   </p:cSld>
@@ -4783,46 +6375,12 @@
           <a:chExt cx="0" cy="0"/>
         </a:xfrm>
       </p:grpSpPr>
-      <p:sp>
-        <p:nvSpPr>
-          <p:cNvPr id="2" name="Title 1">
-            <a:extLst>
-              <a:ext uri="{FF2B5EF4-FFF2-40B4-BE49-F238E27FC236}">
-                <a16:creationId xmlns:a16="http://schemas.microsoft.com/office/drawing/2014/main" id="{2ECC951F-E285-F85A-93AC-AAD7AF400AC2}"/>
-              </a:ext>
-            </a:extLst>
-          </p:cNvPr>
-          <p:cNvSpPr>
-            <a:spLocks noGrp="1"/>
-          </p:cNvSpPr>
-          <p:nvPr>
-            <p:ph type="title"/>
-          </p:nvPr>
-        </p:nvSpPr>
-        <p:spPr>
-          <a:xfrm>
-            <a:off x="346587" y="337769"/>
-            <a:ext cx="10515600" cy="815617"/>
-          </a:xfrm>
-        </p:spPr>
-        <p:txBody>
-          <a:bodyPr/>
-          <a:lstStyle/>
-          <a:p>
-            <a:r>
-              <a:rPr lang="en-US" dirty="0"/>
-              <a:t>dotnet-counters</a:t>
-            </a:r>
-            <a:endParaRPr lang="en-GB" dirty="0"/>
-          </a:p>
-        </p:txBody>
-      </p:sp>
       <p:pic>
         <p:nvPicPr>
-          <p:cNvPr id="7" name="Picture 6" descr="A screenshot of a computer program&#10;&#10;AI-generated content may be incorrect.">
-            <a:extLst>
-              <a:ext uri="{FF2B5EF4-FFF2-40B4-BE49-F238E27FC236}">
-                <a16:creationId xmlns:a16="http://schemas.microsoft.com/office/drawing/2014/main" id="{33DCA029-F29A-819A-34A7-9E0FBB466DDD}"/>
+          <p:cNvPr id="5" name="Picture 4" descr="A screenshot of a computer screen&#10;&#10;AI-generated content may be incorrect.">
+            <a:extLst>
+              <a:ext uri="{FF2B5EF4-FFF2-40B4-BE49-F238E27FC236}">
+                <a16:creationId xmlns:a16="http://schemas.microsoft.com/office/drawing/2014/main" id="{2EC1C68A-2892-A245-B58B-9BECA4271562}"/>
               </a:ext>
             </a:extLst>
           </p:cNvPr>
@@ -4839,8 +6397,8 @@
         </p:blipFill>
         <p:spPr>
           <a:xfrm>
-            <a:off x="963560" y="1690688"/>
-            <a:ext cx="4248003" cy="4421734"/>
+            <a:off x="446358" y="1494399"/>
+            <a:ext cx="11560542" cy="4816257"/>
           </a:xfrm>
           <a:prstGeom prst="rect">
             <a:avLst/>
@@ -4849,106 +6407,63 @@
       </p:pic>
       <p:sp>
         <p:nvSpPr>
-          <p:cNvPr id="8" name="TextBox 7">
-            <a:extLst>
-              <a:ext uri="{FF2B5EF4-FFF2-40B4-BE49-F238E27FC236}">
-                <a16:creationId xmlns:a16="http://schemas.microsoft.com/office/drawing/2014/main" id="{F71C832C-9136-6192-C99A-63A4D1B7E38E}"/>
-              </a:ext>
-            </a:extLst>
-          </p:cNvPr>
-          <p:cNvSpPr txBox="1"/>
+          <p:cNvPr id="6" name="Title 1">
+            <a:extLst>
+              <a:ext uri="{FF2B5EF4-FFF2-40B4-BE49-F238E27FC236}">
+                <a16:creationId xmlns:a16="http://schemas.microsoft.com/office/drawing/2014/main" id="{57BFBF5F-0C94-943F-DE37-78953EE7A9CE}"/>
+              </a:ext>
+            </a:extLst>
+          </p:cNvPr>
+          <p:cNvSpPr txBox="1">
+            <a:spLocks/>
+          </p:cNvSpPr>
           <p:nvPr/>
         </p:nvSpPr>
         <p:spPr>
           <a:xfrm>
-            <a:off x="346587" y="1052705"/>
-            <a:ext cx="6690486" cy="369332"/>
+            <a:off x="493886" y="281329"/>
+            <a:ext cx="7522029" cy="639990"/>
           </a:xfrm>
           <a:prstGeom prst="rect">
             <a:avLst/>
           </a:prstGeom>
-          <a:noFill/>
-        </p:spPr>
-        <p:txBody>
-          <a:bodyPr wrap="none" rtlCol="0">
-            <a:spAutoFit/>
+        </p:spPr>
+        <p:txBody>
+          <a:bodyPr vert="horz" lIns="91440" tIns="45720" rIns="91440" bIns="45720" rtlCol="0" anchor="ctr">
+            <a:normAutofit fontScale="90000" lnSpcReduction="10000"/>
           </a:bodyPr>
-          <a:lstStyle/>
-          <a:p>
-            <a:r>
-              <a:rPr lang="en-GB" dirty="0">
-                <a:hlinkClick r:id="rId3"/>
-              </a:rPr>
-              <a:t>dotnet-counters diagnostic tool - .NET CLI - .NET | Microsoft Learn</a:t>
+          <a:lstStyle>
+            <a:lvl1pPr algn="l" defTabSz="914400" rtl="0" eaLnBrk="1" latinLnBrk="0" hangingPunct="1">
+              <a:lnSpc>
+                <a:spcPct val="90000"/>
+              </a:lnSpc>
+              <a:spcBef>
+                <a:spcPct val="0"/>
+              </a:spcBef>
+              <a:buNone/>
+              <a:defRPr sz="4400" kern="1200">
+                <a:solidFill>
+                  <a:schemeClr val="tx1"/>
+                </a:solidFill>
+                <a:latin typeface="+mj-lt"/>
+                <a:ea typeface="+mj-ea"/>
+                <a:cs typeface="+mj-cs"/>
+              </a:defRPr>
+            </a:lvl1pPr>
+          </a:lstStyle>
+          <a:p>
+            <a:r>
+              <a:rPr lang="en-US" dirty="0"/>
+              <a:t>SharpLab.io</a:t>
             </a:r>
             <a:endParaRPr lang="en-GB" dirty="0"/>
           </a:p>
         </p:txBody>
       </p:sp>
-      <p:pic>
-        <p:nvPicPr>
-          <p:cNvPr id="10" name="Picture 9" descr="A screenshot of a computer&#10;&#10;AI-generated content may be incorrect.">
-            <a:extLst>
-              <a:ext uri="{FF2B5EF4-FFF2-40B4-BE49-F238E27FC236}">
-                <a16:creationId xmlns:a16="http://schemas.microsoft.com/office/drawing/2014/main" id="{8515AAEF-6A31-3769-EFAB-6C59C83927BE}"/>
-              </a:ext>
-            </a:extLst>
-          </p:cNvPr>
-          <p:cNvPicPr>
-            <a:picLocks noChangeAspect="1"/>
-          </p:cNvPicPr>
-          <p:nvPr/>
-        </p:nvPicPr>
-        <p:blipFill>
-          <a:blip r:embed="rId4"/>
-          <a:stretch>
-            <a:fillRect/>
-          </a:stretch>
-        </p:blipFill>
-        <p:spPr>
-          <a:xfrm>
-            <a:off x="7037073" y="1582992"/>
-            <a:ext cx="3445853" cy="2176709"/>
-          </a:xfrm>
-          <a:prstGeom prst="rect">
-            <a:avLst/>
-          </a:prstGeom>
-        </p:spPr>
-      </p:pic>
-      <p:pic>
-        <p:nvPicPr>
-          <p:cNvPr id="12" name="Picture 11" descr="A screenshot of a black screen&#10;&#10;AI-generated content may be incorrect.">
-            <a:extLst>
-              <a:ext uri="{FF2B5EF4-FFF2-40B4-BE49-F238E27FC236}">
-                <a16:creationId xmlns:a16="http://schemas.microsoft.com/office/drawing/2014/main" id="{D2D896EA-94C5-711C-631D-692C2CD03055}"/>
-              </a:ext>
-            </a:extLst>
-          </p:cNvPr>
-          <p:cNvPicPr>
-            <a:picLocks noChangeAspect="1"/>
-          </p:cNvPicPr>
-          <p:nvPr/>
-        </p:nvPicPr>
-        <p:blipFill>
-          <a:blip r:embed="rId5"/>
-          <a:stretch>
-            <a:fillRect/>
-          </a:stretch>
-        </p:blipFill>
-        <p:spPr>
-          <a:xfrm>
-            <a:off x="7446495" y="3901555"/>
-            <a:ext cx="2403316" cy="2176709"/>
-          </a:xfrm>
-          <a:prstGeom prst="rect">
-            <a:avLst/>
-          </a:prstGeom>
-        </p:spPr>
-      </p:pic>
     </p:spTree>
     <p:extLst>
       <p:ext uri="{BB962C8B-B14F-4D97-AF65-F5344CB8AC3E}">
-        <p14:creationId xmlns:p14="http://schemas.microsoft.com/office/powerpoint/2010/main" val="278262112"/>
+        <p14:creationId xmlns:p14="http://schemas.microsoft.com/office/powerpoint/2010/main" val="352101287"/>
       </p:ext>
     </p:extLst>
   </p:cSld>
@@ -4980,7 +6495,7 @@
           <p:cNvPr id="2" name="Title 1">
             <a:extLst>
               <a:ext uri="{FF2B5EF4-FFF2-40B4-BE49-F238E27FC236}">
-                <a16:creationId xmlns:a16="http://schemas.microsoft.com/office/drawing/2014/main" id="{E52CDAF6-F905-1C33-AB3C-8BFA532B0BB7}"/>
+                <a16:creationId xmlns:a16="http://schemas.microsoft.com/office/drawing/2014/main" id="{2ECC951F-E285-F85A-93AC-AAD7AF400AC2}"/>
               </a:ext>
             </a:extLst>
           </p:cNvPr>
@@ -4993,19 +6508,17 @@
         </p:nvSpPr>
         <p:spPr>
           <a:xfrm>
-            <a:off x="482956" y="409800"/>
-            <a:ext cx="9426677" cy="342798"/>
-          </a:xfrm>
-        </p:spPr>
-        <p:txBody>
-          <a:bodyPr>
-            <a:normAutofit fontScale="90000"/>
-          </a:bodyPr>
+            <a:off x="346587" y="337769"/>
+            <a:ext cx="10515600" cy="815617"/>
+          </a:xfrm>
+        </p:spPr>
+        <p:txBody>
+          <a:bodyPr/>
           <a:lstStyle/>
           <a:p>
             <a:r>
               <a:rPr lang="en-US" dirty="0"/>
-              <a:t>Visual Studio Profiler</a:t>
+              <a:t>dotnet-counters</a:t>
             </a:r>
             <a:endParaRPr lang="en-GB" dirty="0"/>
           </a:p>
@@ -5013,10 +6526,10 @@
       </p:sp>
       <p:pic>
         <p:nvPicPr>
-          <p:cNvPr id="11" name="Picture 10" descr="A screenshot of a computer&#10;&#10;AI-generated content may be incorrect.">
-            <a:extLst>
-              <a:ext uri="{FF2B5EF4-FFF2-40B4-BE49-F238E27FC236}">
-                <a16:creationId xmlns:a16="http://schemas.microsoft.com/office/drawing/2014/main" id="{1CAAE6CA-EBD3-DAA1-9007-65DD2CE01865}"/>
+          <p:cNvPr id="7" name="Picture 6" descr="A screenshot of a computer program&#10;&#10;AI-generated content may be incorrect.">
+            <a:extLst>
+              <a:ext uri="{FF2B5EF4-FFF2-40B4-BE49-F238E27FC236}">
+                <a16:creationId xmlns:a16="http://schemas.microsoft.com/office/drawing/2014/main" id="{33DCA029-F29A-819A-34A7-9E0FBB466DDD}"/>
               </a:ext>
             </a:extLst>
           </p:cNvPr>
@@ -5033,50 +6546,58 @@
         </p:blipFill>
         <p:spPr>
           <a:xfrm>
-            <a:off x="482956" y="3010003"/>
-            <a:ext cx="5425987" cy="2920181"/>
+            <a:off x="963560" y="1690688"/>
+            <a:ext cx="4248003" cy="4421734"/>
           </a:xfrm>
           <a:prstGeom prst="rect">
             <a:avLst/>
           </a:prstGeom>
         </p:spPr>
       </p:pic>
-      <p:pic>
-        <p:nvPicPr>
-          <p:cNvPr id="15" name="Picture 14" descr="A screenshot of a computer&#10;&#10;AI-generated content may be incorrect.">
-            <a:extLst>
-              <a:ext uri="{FF2B5EF4-FFF2-40B4-BE49-F238E27FC236}">
-                <a16:creationId xmlns:a16="http://schemas.microsoft.com/office/drawing/2014/main" id="{E9592F3E-F871-0F5C-A586-DBE8DB20E752}"/>
-              </a:ext>
-            </a:extLst>
-          </p:cNvPr>
-          <p:cNvPicPr>
-            <a:picLocks noChangeAspect="1"/>
-          </p:cNvPicPr>
+      <p:sp>
+        <p:nvSpPr>
+          <p:cNvPr id="8" name="TextBox 7">
+            <a:extLst>
+              <a:ext uri="{FF2B5EF4-FFF2-40B4-BE49-F238E27FC236}">
+                <a16:creationId xmlns:a16="http://schemas.microsoft.com/office/drawing/2014/main" id="{F71C832C-9136-6192-C99A-63A4D1B7E38E}"/>
+              </a:ext>
+            </a:extLst>
+          </p:cNvPr>
+          <p:cNvSpPr txBox="1"/>
           <p:nvPr/>
-        </p:nvPicPr>
-        <p:blipFill>
-          <a:blip r:embed="rId3"/>
-          <a:stretch>
-            <a:fillRect/>
-          </a:stretch>
-        </p:blipFill>
-        <p:spPr>
-          <a:xfrm>
-            <a:off x="6096000" y="3010002"/>
-            <a:ext cx="5454356" cy="2920181"/>
+        </p:nvSpPr>
+        <p:spPr>
+          <a:xfrm>
+            <a:off x="346587" y="1052705"/>
+            <a:ext cx="6690486" cy="369332"/>
           </a:xfrm>
           <a:prstGeom prst="rect">
             <a:avLst/>
           </a:prstGeom>
-        </p:spPr>
-      </p:pic>
+          <a:noFill/>
+        </p:spPr>
+        <p:txBody>
+          <a:bodyPr wrap="none" rtlCol="0">
+            <a:spAutoFit/>
+          </a:bodyPr>
+          <a:lstStyle/>
+          <a:p>
+            <a:r>
+              <a:rPr lang="en-GB" dirty="0">
+                <a:hlinkClick r:id="rId3"/>
+              </a:rPr>
+              <a:t>dotnet-counters diagnostic tool - .NET CLI - .NET | Microsoft Learn</a:t>
+            </a:r>
+            <a:endParaRPr lang="en-GB" dirty="0"/>
+          </a:p>
+        </p:txBody>
+      </p:sp>
       <p:pic>
         <p:nvPicPr>
-          <p:cNvPr id="6" name="Picture 5" descr="A screenshot of a computer&#10;&#10;AI-generated content may be incorrect.">
-            <a:extLst>
-              <a:ext uri="{FF2B5EF4-FFF2-40B4-BE49-F238E27FC236}">
-                <a16:creationId xmlns:a16="http://schemas.microsoft.com/office/drawing/2014/main" id="{C6B6213B-30BE-C24C-8674-BFE14B91292F}"/>
+          <p:cNvPr id="10" name="Picture 9" descr="A screenshot of a computer&#10;&#10;AI-generated content may be incorrect.">
+            <a:extLst>
+              <a:ext uri="{FF2B5EF4-FFF2-40B4-BE49-F238E27FC236}">
+                <a16:creationId xmlns:a16="http://schemas.microsoft.com/office/drawing/2014/main" id="{8515AAEF-6A31-3769-EFAB-6C59C83927BE}"/>
               </a:ext>
             </a:extLst>
           </p:cNvPr>
@@ -5093,8 +6614,8 @@
         </p:blipFill>
         <p:spPr>
           <a:xfrm>
-            <a:off x="6096000" y="970679"/>
-            <a:ext cx="3873910" cy="1821241"/>
+            <a:off x="7037073" y="1582992"/>
+            <a:ext cx="3445853" cy="2176709"/>
           </a:xfrm>
           <a:prstGeom prst="rect">
             <a:avLst/>
@@ -5103,10 +6624,10 @@
       </p:pic>
       <p:pic>
         <p:nvPicPr>
-          <p:cNvPr id="8" name="Picture 7" descr="A screenshot of a computer&#10;&#10;AI-generated content may be incorrect.">
-            <a:extLst>
-              <a:ext uri="{FF2B5EF4-FFF2-40B4-BE49-F238E27FC236}">
-                <a16:creationId xmlns:a16="http://schemas.microsoft.com/office/drawing/2014/main" id="{ABB4F8A4-C3D3-F2C5-A9CD-BE99463F6BAE}"/>
+          <p:cNvPr id="12" name="Picture 11" descr="A screenshot of a black screen&#10;&#10;AI-generated content may be incorrect.">
+            <a:extLst>
+              <a:ext uri="{FF2B5EF4-FFF2-40B4-BE49-F238E27FC236}">
+                <a16:creationId xmlns:a16="http://schemas.microsoft.com/office/drawing/2014/main" id="{D2D896EA-94C5-711C-631D-692C2CD03055}"/>
               </a:ext>
             </a:extLst>
           </p:cNvPr>
@@ -5123,8 +6644,8 @@
         </p:blipFill>
         <p:spPr>
           <a:xfrm>
-            <a:off x="482956" y="970679"/>
-            <a:ext cx="3052036" cy="1821242"/>
+            <a:off x="7446495" y="3901555"/>
+            <a:ext cx="2403316" cy="2176709"/>
           </a:xfrm>
           <a:prstGeom prst="rect">
             <a:avLst/>
@@ -5134,7 +6655,7 @@
     </p:spTree>
     <p:extLst>
       <p:ext uri="{BB962C8B-B14F-4D97-AF65-F5344CB8AC3E}">
-        <p14:creationId xmlns:p14="http://schemas.microsoft.com/office/powerpoint/2010/main" val="2082792431"/>
+        <p14:creationId xmlns:p14="http://schemas.microsoft.com/office/powerpoint/2010/main" val="278262112"/>
       </p:ext>
     </p:extLst>
   </p:cSld>
@@ -5166,7 +6687,7 @@
           <p:cNvPr id="2" name="Title 1">
             <a:extLst>
               <a:ext uri="{FF2B5EF4-FFF2-40B4-BE49-F238E27FC236}">
-                <a16:creationId xmlns:a16="http://schemas.microsoft.com/office/drawing/2014/main" id="{0C8E3292-3446-0EDB-3E93-0F48C1C901A8}"/>
+                <a16:creationId xmlns:a16="http://schemas.microsoft.com/office/drawing/2014/main" id="{E52CDAF6-F905-1C33-AB3C-8BFA532B0BB7}"/>
               </a:ext>
             </a:extLst>
           </p:cNvPr>
@@ -5179,163 +6700,148 @@
         </p:nvSpPr>
         <p:spPr>
           <a:xfrm>
-            <a:off x="695455" y="276531"/>
-            <a:ext cx="10515600" cy="814746"/>
-          </a:xfrm>
-        </p:spPr>
-        <p:txBody>
-          <a:bodyPr/>
+            <a:off x="482956" y="409800"/>
+            <a:ext cx="9426677" cy="342798"/>
+          </a:xfrm>
+        </p:spPr>
+        <p:txBody>
+          <a:bodyPr>
+            <a:normAutofit fontScale="90000"/>
+          </a:bodyPr>
           <a:lstStyle/>
           <a:p>
             <a:r>
               <a:rPr lang="en-US" dirty="0"/>
-              <a:t>Demo</a:t>
+              <a:t>Visual Studio Profiler</a:t>
             </a:r>
             <a:endParaRPr lang="en-GB" dirty="0"/>
           </a:p>
         </p:txBody>
       </p:sp>
-      <p:sp>
-        <p:nvSpPr>
-          <p:cNvPr id="3" name="Content Placeholder 2">
-            <a:extLst>
-              <a:ext uri="{FF2B5EF4-FFF2-40B4-BE49-F238E27FC236}">
-                <a16:creationId xmlns:a16="http://schemas.microsoft.com/office/drawing/2014/main" id="{AA632565-2BBA-7C9A-5B9D-215DDC5F58A0}"/>
-              </a:ext>
-            </a:extLst>
-          </p:cNvPr>
-          <p:cNvSpPr>
-            <a:spLocks noGrp="1"/>
-          </p:cNvSpPr>
-          <p:nvPr>
-            <p:ph idx="1"/>
-          </p:nvPr>
-        </p:nvSpPr>
-        <p:spPr>
-          <a:xfrm>
-            <a:off x="695455" y="1415385"/>
-            <a:ext cx="10515600" cy="4351338"/>
-          </a:xfrm>
-        </p:spPr>
-        <p:txBody>
-          <a:bodyPr>
-            <a:normAutofit fontScale="92500" lnSpcReduction="20000"/>
-          </a:bodyPr>
-          <a:lstStyle/>
-          <a:p>
-            <a:r>
-              <a:rPr lang="en-US" sz="1600" dirty="0"/>
-              <a:t>Result Pattern</a:t>
-            </a:r>
-          </a:p>
-          <a:p>
-            <a:r>
-              <a:rPr lang="en-US" sz="1600" dirty="0"/>
-              <a:t>Fast way to add/update dictionaries</a:t>
-            </a:r>
-          </a:p>
-          <a:p>
-            <a:r>
-              <a:rPr lang="en-US" sz="1600" dirty="0"/>
-              <a:t>Fast iteration benchmarks</a:t>
-            </a:r>
-          </a:p>
-          <a:p>
-            <a:r>
-              <a:rPr lang="en-GB" sz="1600" dirty="0" err="1"/>
-              <a:t>Zlinq</a:t>
-            </a:r>
-            <a:endParaRPr lang="en-GB" sz="1600" dirty="0"/>
-          </a:p>
-          <a:p>
-            <a:r>
-              <a:rPr lang="en-GB" sz="1600" dirty="0"/>
-              <a:t>Frozen Dictionary</a:t>
-            </a:r>
-          </a:p>
-          <a:p>
-            <a:r>
-              <a:rPr lang="en-GB" sz="1600" dirty="0"/>
-              <a:t>Ref struct</a:t>
-            </a:r>
-          </a:p>
-          <a:p>
-            <a:r>
-              <a:rPr lang="en-US" sz="1600" dirty="0"/>
-              <a:t>Casting</a:t>
-            </a:r>
-          </a:p>
-          <a:p>
-            <a:r>
-              <a:rPr lang="en-US" sz="1600" dirty="0"/>
-              <a:t>How Generics affect performance</a:t>
-            </a:r>
-          </a:p>
-          <a:p>
-            <a:pPr lvl="1"/>
-            <a:r>
-              <a:rPr lang="en-US" sz="1600" dirty="0"/>
-              <a:t>Boxing</a:t>
-            </a:r>
-          </a:p>
-          <a:p>
-            <a:pPr lvl="1"/>
-            <a:r>
-              <a:rPr lang="en-US" sz="1600" dirty="0" err="1"/>
-              <a:t>GenericList</a:t>
-            </a:r>
-            <a:endParaRPr lang="en-US" sz="1600" dirty="0"/>
-          </a:p>
-          <a:p>
-            <a:pPr lvl="1"/>
-            <a:r>
-              <a:rPr lang="en-US" sz="1600" dirty="0"/>
-              <a:t>Service</a:t>
-            </a:r>
-          </a:p>
-          <a:p>
-            <a:pPr lvl="1"/>
-            <a:r>
-              <a:rPr lang="en-US" sz="1600" dirty="0" err="1"/>
-              <a:t>CallpathElimination</a:t>
-            </a:r>
-            <a:endParaRPr lang="en-US" sz="1600" dirty="0"/>
-          </a:p>
-          <a:p>
-            <a:pPr lvl="2"/>
-            <a:r>
-              <a:rPr lang="en-US" sz="1600" dirty="0" err="1"/>
-              <a:t>CallpathFactory</a:t>
-            </a:r>
-            <a:endParaRPr lang="en-US" sz="1600" dirty="0"/>
-          </a:p>
-          <a:p>
-            <a:r>
-              <a:rPr lang="en-GB" sz="1600" dirty="0"/>
-              <a:t>Span</a:t>
-            </a:r>
-          </a:p>
-          <a:p>
-            <a:r>
-              <a:rPr lang="en-GB" sz="1600" dirty="0"/>
-              <a:t>CSV Parser</a:t>
-            </a:r>
-          </a:p>
-          <a:p>
-            <a:r>
-              <a:rPr lang="en-GB" sz="1600" dirty="0"/>
-              <a:t>In and out keywords with ref struct</a:t>
-            </a:r>
-          </a:p>
-          <a:p>
-            <a:endParaRPr lang="en-GB" sz="1600" dirty="0"/>
-          </a:p>
-        </p:txBody>
-      </p:sp>
+      <p:pic>
+        <p:nvPicPr>
+          <p:cNvPr id="11" name="Picture 10" descr="A screenshot of a computer&#10;&#10;AI-generated content may be incorrect.">
+            <a:extLst>
+              <a:ext uri="{FF2B5EF4-FFF2-40B4-BE49-F238E27FC236}">
+                <a16:creationId xmlns:a16="http://schemas.microsoft.com/office/drawing/2014/main" id="{1CAAE6CA-EBD3-DAA1-9007-65DD2CE01865}"/>
+              </a:ext>
+            </a:extLst>
+          </p:cNvPr>
+          <p:cNvPicPr>
+            <a:picLocks noChangeAspect="1"/>
+          </p:cNvPicPr>
+          <p:nvPr/>
+        </p:nvPicPr>
+        <p:blipFill>
+          <a:blip r:embed="rId2"/>
+          <a:stretch>
+            <a:fillRect/>
+          </a:stretch>
+        </p:blipFill>
+        <p:spPr>
+          <a:xfrm>
+            <a:off x="482956" y="3010003"/>
+            <a:ext cx="5425987" cy="2920181"/>
+          </a:xfrm>
+          <a:prstGeom prst="rect">
+            <a:avLst/>
+          </a:prstGeom>
+        </p:spPr>
+      </p:pic>
+      <p:pic>
+        <p:nvPicPr>
+          <p:cNvPr id="15" name="Picture 14" descr="A screenshot of a computer&#10;&#10;AI-generated content may be incorrect.">
+            <a:extLst>
+              <a:ext uri="{FF2B5EF4-FFF2-40B4-BE49-F238E27FC236}">
+                <a16:creationId xmlns:a16="http://schemas.microsoft.com/office/drawing/2014/main" id="{E9592F3E-F871-0F5C-A586-DBE8DB20E752}"/>
+              </a:ext>
+            </a:extLst>
+          </p:cNvPr>
+          <p:cNvPicPr>
+            <a:picLocks noChangeAspect="1"/>
+          </p:cNvPicPr>
+          <p:nvPr/>
+        </p:nvPicPr>
+        <p:blipFill>
+          <a:blip r:embed="rId3"/>
+          <a:stretch>
+            <a:fillRect/>
+          </a:stretch>
+        </p:blipFill>
+        <p:spPr>
+          <a:xfrm>
+            <a:off x="6096000" y="3010002"/>
+            <a:ext cx="5454356" cy="2920181"/>
+          </a:xfrm>
+          <a:prstGeom prst="rect">
+            <a:avLst/>
+          </a:prstGeom>
+        </p:spPr>
+      </p:pic>
+      <p:pic>
+        <p:nvPicPr>
+          <p:cNvPr id="6" name="Picture 5" descr="A screenshot of a computer&#10;&#10;AI-generated content may be incorrect.">
+            <a:extLst>
+              <a:ext uri="{FF2B5EF4-FFF2-40B4-BE49-F238E27FC236}">
+                <a16:creationId xmlns:a16="http://schemas.microsoft.com/office/drawing/2014/main" id="{C6B6213B-30BE-C24C-8674-BFE14B91292F}"/>
+              </a:ext>
+            </a:extLst>
+          </p:cNvPr>
+          <p:cNvPicPr>
+            <a:picLocks noChangeAspect="1"/>
+          </p:cNvPicPr>
+          <p:nvPr/>
+        </p:nvPicPr>
+        <p:blipFill>
+          <a:blip r:embed="rId4"/>
+          <a:stretch>
+            <a:fillRect/>
+          </a:stretch>
+        </p:blipFill>
+        <p:spPr>
+          <a:xfrm>
+            <a:off x="6096000" y="970679"/>
+            <a:ext cx="3873910" cy="1821241"/>
+          </a:xfrm>
+          <a:prstGeom prst="rect">
+            <a:avLst/>
+          </a:prstGeom>
+        </p:spPr>
+      </p:pic>
+      <p:pic>
+        <p:nvPicPr>
+          <p:cNvPr id="8" name="Picture 7" descr="A screenshot of a computer&#10;&#10;AI-generated content may be incorrect.">
+            <a:extLst>
+              <a:ext uri="{FF2B5EF4-FFF2-40B4-BE49-F238E27FC236}">
+                <a16:creationId xmlns:a16="http://schemas.microsoft.com/office/drawing/2014/main" id="{ABB4F8A4-C3D3-F2C5-A9CD-BE99463F6BAE}"/>
+              </a:ext>
+            </a:extLst>
+          </p:cNvPr>
+          <p:cNvPicPr>
+            <a:picLocks noChangeAspect="1"/>
+          </p:cNvPicPr>
+          <p:nvPr/>
+        </p:nvPicPr>
+        <p:blipFill>
+          <a:blip r:embed="rId5"/>
+          <a:stretch>
+            <a:fillRect/>
+          </a:stretch>
+        </p:blipFill>
+        <p:spPr>
+          <a:xfrm>
+            <a:off x="482956" y="970679"/>
+            <a:ext cx="3052036" cy="1821242"/>
+          </a:xfrm>
+          <a:prstGeom prst="rect">
+            <a:avLst/>
+          </a:prstGeom>
+        </p:spPr>
+      </p:pic>
     </p:spTree>
     <p:extLst>
       <p:ext uri="{BB962C8B-B14F-4D97-AF65-F5344CB8AC3E}">
-        <p14:creationId xmlns:p14="http://schemas.microsoft.com/office/powerpoint/2010/main" val="2964004684"/>
+        <p14:creationId xmlns:p14="http://schemas.microsoft.com/office/powerpoint/2010/main" val="2082792431"/>
       </p:ext>
     </p:extLst>
   </p:cSld>
@@ -5364,10 +6870,44 @@
       </p:grpSpPr>
       <p:sp>
         <p:nvSpPr>
+          <p:cNvPr id="2" name="Title 1">
+            <a:extLst>
+              <a:ext uri="{FF2B5EF4-FFF2-40B4-BE49-F238E27FC236}">
+                <a16:creationId xmlns:a16="http://schemas.microsoft.com/office/drawing/2014/main" id="{0C8E3292-3446-0EDB-3E93-0F48C1C901A8}"/>
+              </a:ext>
+            </a:extLst>
+          </p:cNvPr>
+          <p:cNvSpPr>
+            <a:spLocks noGrp="1"/>
+          </p:cNvSpPr>
+          <p:nvPr>
+            <p:ph type="title"/>
+          </p:nvPr>
+        </p:nvSpPr>
+        <p:spPr>
+          <a:xfrm>
+            <a:off x="695455" y="276531"/>
+            <a:ext cx="10515600" cy="814746"/>
+          </a:xfrm>
+        </p:spPr>
+        <p:txBody>
+          <a:bodyPr/>
+          <a:lstStyle/>
+          <a:p>
+            <a:r>
+              <a:rPr lang="en-US" dirty="0"/>
+              <a:t>Demo</a:t>
+            </a:r>
+            <a:endParaRPr lang="en-GB" dirty="0"/>
+          </a:p>
+        </p:txBody>
+      </p:sp>
+      <p:sp>
+        <p:nvSpPr>
           <p:cNvPr id="3" name="Content Placeholder 2">
             <a:extLst>
               <a:ext uri="{FF2B5EF4-FFF2-40B4-BE49-F238E27FC236}">
-                <a16:creationId xmlns:a16="http://schemas.microsoft.com/office/drawing/2014/main" id="{BF24EC81-AB7E-515F-98DB-93AD57E028A1}"/>
+                <a16:creationId xmlns:a16="http://schemas.microsoft.com/office/drawing/2014/main" id="{AA632565-2BBA-7C9A-5B9D-215DDC5F58A0}"/>
               </a:ext>
             </a:extLst>
           </p:cNvPr>
@@ -5380,43 +6920,129 @@
         </p:nvSpPr>
         <p:spPr>
           <a:xfrm>
-            <a:off x="838200" y="408214"/>
-            <a:ext cx="10515600" cy="5768749"/>
-          </a:xfrm>
-        </p:spPr>
-        <p:txBody>
-          <a:bodyPr/>
-          <a:lstStyle/>
-          <a:p>
-            <a:r>
-              <a:rPr lang="en-US" dirty="0"/>
-              <a:t>Resources</a:t>
-            </a:r>
-          </a:p>
-          <a:p>
-            <a:endParaRPr lang="en-US" dirty="0"/>
+            <a:off x="695455" y="1415385"/>
+            <a:ext cx="10515600" cy="4351338"/>
+          </a:xfrm>
+        </p:spPr>
+        <p:txBody>
+          <a:bodyPr>
+            <a:normAutofit fontScale="92500" lnSpcReduction="20000"/>
+          </a:bodyPr>
+          <a:lstStyle/>
+          <a:p>
+            <a:r>
+              <a:rPr lang="en-US" sz="1600" dirty="0"/>
+              <a:t>Result Pattern</a:t>
+            </a:r>
+          </a:p>
+          <a:p>
+            <a:r>
+              <a:rPr lang="en-US" sz="1600" dirty="0"/>
+              <a:t>Fast way to add/update dictionaries</a:t>
+            </a:r>
+          </a:p>
+          <a:p>
+            <a:r>
+              <a:rPr lang="en-US" sz="1600" dirty="0"/>
+              <a:t>Fast iteration benchmarks</a:t>
+            </a:r>
+          </a:p>
+          <a:p>
+            <a:r>
+              <a:rPr lang="en-GB" sz="1600" dirty="0" err="1"/>
+              <a:t>Zlinq</a:t>
+            </a:r>
+            <a:endParaRPr lang="en-GB" sz="1600" dirty="0"/>
+          </a:p>
+          <a:p>
+            <a:r>
+              <a:rPr lang="en-GB" sz="1600" dirty="0"/>
+              <a:t>Frozen Dictionary</a:t>
+            </a:r>
+          </a:p>
+          <a:p>
+            <a:r>
+              <a:rPr lang="en-GB" sz="1600" dirty="0"/>
+              <a:t>Ref struct</a:t>
+            </a:r>
+          </a:p>
+          <a:p>
+            <a:r>
+              <a:rPr lang="en-US" sz="1600" dirty="0"/>
+              <a:t>Casting</a:t>
+            </a:r>
+          </a:p>
+          <a:p>
+            <a:r>
+              <a:rPr lang="en-US" sz="1600" dirty="0"/>
+              <a:t>How Generics affect performance</a:t>
+            </a:r>
           </a:p>
           <a:p>
             <a:pPr lvl="1"/>
             <a:r>
-              <a:rPr lang="en-GB" b="1" dirty="0"/>
-              <a:t>[TODO]</a:t>
+              <a:rPr lang="en-US" sz="1600" dirty="0"/>
+              <a:t>Boxing</a:t>
             </a:r>
           </a:p>
           <a:p>
             <a:pPr lvl="1"/>
-            <a:endParaRPr lang="en-GB" b="1" dirty="0"/>
+            <a:r>
+              <a:rPr lang="en-US" sz="1600" dirty="0" err="1"/>
+              <a:t>GenericList</a:t>
+            </a:r>
+            <a:endParaRPr lang="en-US" sz="1600" dirty="0"/>
           </a:p>
           <a:p>
             <a:pPr lvl="1"/>
-            <a:endParaRPr lang="en-GB" dirty="0"/>
+            <a:r>
+              <a:rPr lang="en-US" sz="1600" dirty="0"/>
+              <a:t>Service</a:t>
+            </a:r>
+          </a:p>
+          <a:p>
+            <a:pPr lvl="1"/>
+            <a:r>
+              <a:rPr lang="en-US" sz="1600" dirty="0" err="1"/>
+              <a:t>CallpathElimination</a:t>
+            </a:r>
+            <a:endParaRPr lang="en-US" sz="1600" dirty="0"/>
+          </a:p>
+          <a:p>
+            <a:pPr lvl="2"/>
+            <a:r>
+              <a:rPr lang="en-US" sz="1600" dirty="0" err="1"/>
+              <a:t>CallpathFactory</a:t>
+            </a:r>
+            <a:endParaRPr lang="en-US" sz="1600" dirty="0"/>
+          </a:p>
+          <a:p>
+            <a:r>
+              <a:rPr lang="en-GB" sz="1600" dirty="0"/>
+              <a:t>Span</a:t>
+            </a:r>
+          </a:p>
+          <a:p>
+            <a:r>
+              <a:rPr lang="en-GB" sz="1600" dirty="0"/>
+              <a:t>CSV Parser</a:t>
+            </a:r>
+          </a:p>
+          <a:p>
+            <a:r>
+              <a:rPr lang="en-GB" sz="1600" dirty="0"/>
+              <a:t>In and out keywords with ref struct</a:t>
+            </a:r>
+          </a:p>
+          <a:p>
+            <a:endParaRPr lang="en-GB" sz="1600" dirty="0"/>
           </a:p>
         </p:txBody>
       </p:sp>
     </p:spTree>
     <p:extLst>
       <p:ext uri="{BB962C8B-B14F-4D97-AF65-F5344CB8AC3E}">
-        <p14:creationId xmlns:p14="http://schemas.microsoft.com/office/powerpoint/2010/main" val="1725615428"/>
+        <p14:creationId xmlns:p14="http://schemas.microsoft.com/office/powerpoint/2010/main" val="2964004684"/>
       </p:ext>
     </p:extLst>
   </p:cSld>

</xml_diff>